<commit_message>
architecture diagram updated + list of what to put in final notebook
</commit_message>
<xml_diff>
--- a/ur_lab/arch_diagram.pptx
+++ b/ur_lab/arch_diagram.pptx
@@ -6,6 +6,7 @@
   </p:sldMasterIdLst>
   <p:sldIdLst>
     <p:sldId id="256" r:id="rId2"/>
+    <p:sldId id="257" r:id="rId3"/>
   </p:sldIdLst>
   <p:sldSz cx="12192000" cy="6858000"/>
   <p:notesSz cx="6858000" cy="9144000"/>
@@ -104,6 +105,11 @@
       </a:defRPr>
     </a:lvl9pPr>
   </p:defaultTextStyle>
+  <p:extLst>
+    <p:ext uri="{EFAFB233-063F-42B5-8137-9DF3F51BA10A}">
+      <p15:sldGuideLst xmlns:p15="http://schemas.microsoft.com/office/powerpoint/2012/main"/>
+    </p:ext>
+  </p:extLst>
 </p:presentation>
 </file>
 
@@ -254,7 +260,7 @@
           <a:p>
             <a:fld id="{499D446D-D146-4CC0-9A38-15AC6317F8CC}" type="datetimeFigureOut">
               <a:rPr lang="en-US" smtClean="0"/>
-              <a:t>3/3/2025</a:t>
+              <a:t>3/6/2025</a:t>
             </a:fld>
             <a:endParaRPr lang="en-US"/>
           </a:p>
@@ -452,7 +458,7 @@
           <a:p>
             <a:fld id="{499D446D-D146-4CC0-9A38-15AC6317F8CC}" type="datetimeFigureOut">
               <a:rPr lang="en-US" smtClean="0"/>
-              <a:t>3/3/2025</a:t>
+              <a:t>3/6/2025</a:t>
             </a:fld>
             <a:endParaRPr lang="en-US"/>
           </a:p>
@@ -660,7 +666,7 @@
           <a:p>
             <a:fld id="{499D446D-D146-4CC0-9A38-15AC6317F8CC}" type="datetimeFigureOut">
               <a:rPr lang="en-US" smtClean="0"/>
-              <a:t>3/3/2025</a:t>
+              <a:t>3/6/2025</a:t>
             </a:fld>
             <a:endParaRPr lang="en-US"/>
           </a:p>
@@ -858,7 +864,7 @@
           <a:p>
             <a:fld id="{499D446D-D146-4CC0-9A38-15AC6317F8CC}" type="datetimeFigureOut">
               <a:rPr lang="en-US" smtClean="0"/>
-              <a:t>3/3/2025</a:t>
+              <a:t>3/6/2025</a:t>
             </a:fld>
             <a:endParaRPr lang="en-US"/>
           </a:p>
@@ -1133,7 +1139,7 @@
           <a:p>
             <a:fld id="{499D446D-D146-4CC0-9A38-15AC6317F8CC}" type="datetimeFigureOut">
               <a:rPr lang="en-US" smtClean="0"/>
-              <a:t>3/3/2025</a:t>
+              <a:t>3/6/2025</a:t>
             </a:fld>
             <a:endParaRPr lang="en-US"/>
           </a:p>
@@ -1398,7 +1404,7 @@
           <a:p>
             <a:fld id="{499D446D-D146-4CC0-9A38-15AC6317F8CC}" type="datetimeFigureOut">
               <a:rPr lang="en-US" smtClean="0"/>
-              <a:t>3/3/2025</a:t>
+              <a:t>3/6/2025</a:t>
             </a:fld>
             <a:endParaRPr lang="en-US"/>
           </a:p>
@@ -1810,7 +1816,7 @@
           <a:p>
             <a:fld id="{499D446D-D146-4CC0-9A38-15AC6317F8CC}" type="datetimeFigureOut">
               <a:rPr lang="en-US" smtClean="0"/>
-              <a:t>3/3/2025</a:t>
+              <a:t>3/6/2025</a:t>
             </a:fld>
             <a:endParaRPr lang="en-US"/>
           </a:p>
@@ -1951,7 +1957,7 @@
           <a:p>
             <a:fld id="{499D446D-D146-4CC0-9A38-15AC6317F8CC}" type="datetimeFigureOut">
               <a:rPr lang="en-US" smtClean="0"/>
-              <a:t>3/3/2025</a:t>
+              <a:t>3/6/2025</a:t>
             </a:fld>
             <a:endParaRPr lang="en-US"/>
           </a:p>
@@ -2064,7 +2070,7 @@
           <a:p>
             <a:fld id="{499D446D-D146-4CC0-9A38-15AC6317F8CC}" type="datetimeFigureOut">
               <a:rPr lang="en-US" smtClean="0"/>
-              <a:t>3/3/2025</a:t>
+              <a:t>3/6/2025</a:t>
             </a:fld>
             <a:endParaRPr lang="en-US"/>
           </a:p>
@@ -2375,7 +2381,7 @@
           <a:p>
             <a:fld id="{499D446D-D146-4CC0-9A38-15AC6317F8CC}" type="datetimeFigureOut">
               <a:rPr lang="en-US" smtClean="0"/>
-              <a:t>3/3/2025</a:t>
+              <a:t>3/6/2025</a:t>
             </a:fld>
             <a:endParaRPr lang="en-US"/>
           </a:p>
@@ -2663,7 +2669,7 @@
           <a:p>
             <a:fld id="{499D446D-D146-4CC0-9A38-15AC6317F8CC}" type="datetimeFigureOut">
               <a:rPr lang="en-US" smtClean="0"/>
-              <a:t>3/3/2025</a:t>
+              <a:t>3/6/2025</a:t>
             </a:fld>
             <a:endParaRPr lang="en-US"/>
           </a:p>
@@ -2904,7 +2910,7 @@
           <a:p>
             <a:fld id="{499D446D-D146-4CC0-9A38-15AC6317F8CC}" type="datetimeFigureOut">
               <a:rPr lang="en-US" smtClean="0"/>
-              <a:t>3/3/2025</a:t>
+              <a:t>3/6/2025</a:t>
             </a:fld>
             <a:endParaRPr lang="en-US"/>
           </a:p>
@@ -3335,7 +3341,7 @@
         </p:nvSpPr>
         <p:spPr>
           <a:xfrm>
-            <a:off x="3084830" y="-62230"/>
+            <a:off x="2307590" y="-62230"/>
             <a:ext cx="1917700" cy="641350"/>
           </a:xfrm>
           <a:prstGeom prst="rect">
@@ -3384,7 +3390,7 @@
         </p:nvSpPr>
         <p:spPr>
           <a:xfrm>
-            <a:off x="5053332" y="-62230"/>
+            <a:off x="4276092" y="-62230"/>
             <a:ext cx="1917700" cy="641350"/>
           </a:xfrm>
           <a:prstGeom prst="rect">
@@ -3433,7 +3439,7 @@
         </p:nvSpPr>
         <p:spPr>
           <a:xfrm>
-            <a:off x="4351655" y="1366520"/>
+            <a:off x="3574415" y="1366520"/>
             <a:ext cx="1352550" cy="393700"/>
           </a:xfrm>
           <a:prstGeom prst="rect">
@@ -3482,7 +3488,7 @@
         </p:nvSpPr>
         <p:spPr>
           <a:xfrm>
-            <a:off x="843280" y="-62230"/>
+            <a:off x="66040" y="-62230"/>
             <a:ext cx="1917700" cy="641350"/>
           </a:xfrm>
           <a:prstGeom prst="rect">
@@ -3511,10 +3517,9 @@
           <a:p>
             <a:pPr algn="ctr"/>
             <a:r>
-              <a:rPr lang="en-US" sz="1600" dirty="0" err="1"/>
-              <a:t>Klampt</a:t>
-            </a:r>
-            <a:endParaRPr lang="en-US" sz="1600" dirty="0"/>
+              <a:rPr lang="en-US" sz="1600" dirty="0"/>
+              <a:t>KLAMPT</a:t>
+            </a:r>
           </a:p>
         </p:txBody>
       </p:sp>
@@ -3532,7 +3537,7 @@
         </p:nvGrpSpPr>
         <p:grpSpPr>
           <a:xfrm>
-            <a:off x="5027930" y="556895"/>
+            <a:off x="4250690" y="556895"/>
             <a:ext cx="1003300" cy="825500"/>
             <a:chOff x="6096000" y="577301"/>
             <a:chExt cx="973138" cy="797474"/>
@@ -3649,7 +3654,7 @@
         </p:nvGrpSpPr>
         <p:grpSpPr>
           <a:xfrm rot="15402771">
-            <a:off x="4034686" y="567535"/>
+            <a:off x="3257446" y="567535"/>
             <a:ext cx="1003300" cy="825500"/>
             <a:chOff x="6096000" y="577301"/>
             <a:chExt cx="973138" cy="797474"/>
@@ -3766,7 +3771,7 @@
         </p:nvSpPr>
         <p:spPr>
           <a:xfrm>
-            <a:off x="1125855" y="1331595"/>
+            <a:off x="348615" y="1331595"/>
             <a:ext cx="1352550" cy="393700"/>
           </a:xfrm>
           <a:prstGeom prst="rect">
@@ -3818,7 +3823,7 @@
         </p:nvCxnSpPr>
         <p:spPr>
           <a:xfrm flipV="1">
-            <a:off x="1802130" y="579120"/>
+            <a:off x="1024890" y="579120"/>
             <a:ext cx="0" cy="752475"/>
           </a:xfrm>
           <a:prstGeom prst="straightConnector1">
@@ -3859,7 +3864,7 @@
         </p:nvSpPr>
         <p:spPr>
           <a:xfrm>
-            <a:off x="4166454" y="2146048"/>
+            <a:off x="3389214" y="2146048"/>
             <a:ext cx="1812923" cy="785748"/>
           </a:xfrm>
           <a:prstGeom prst="rect">
@@ -3916,7 +3921,7 @@
         </p:nvSpPr>
         <p:spPr>
           <a:xfrm>
-            <a:off x="4236833" y="2597908"/>
+            <a:off x="3459593" y="2597908"/>
             <a:ext cx="790045" cy="239961"/>
           </a:xfrm>
           <a:prstGeom prst="rect">
@@ -3965,7 +3970,7 @@
         </p:nvSpPr>
         <p:spPr>
           <a:xfrm>
-            <a:off x="1125856" y="1734820"/>
+            <a:off x="348616" y="1734820"/>
             <a:ext cx="1352550" cy="393700"/>
           </a:xfrm>
           <a:prstGeom prst="rect">
@@ -4014,7 +4019,7 @@
         </p:nvSpPr>
         <p:spPr>
           <a:xfrm>
-            <a:off x="5066829" y="2597907"/>
+            <a:off x="4289589" y="2597907"/>
             <a:ext cx="872596" cy="239961"/>
           </a:xfrm>
           <a:prstGeom prst="rect">
@@ -4063,7 +4068,7 @@
         </p:nvGrpSpPr>
         <p:grpSpPr>
           <a:xfrm rot="18500679">
-            <a:off x="4891577" y="1829924"/>
+            <a:off x="4114337" y="1829924"/>
             <a:ext cx="319396" cy="193567"/>
             <a:chOff x="5975045" y="638232"/>
             <a:chExt cx="309794" cy="186995"/>
@@ -4180,7 +4185,7 @@
         </p:nvSpPr>
         <p:spPr>
           <a:xfrm>
-            <a:off x="6304732" y="1348263"/>
+            <a:off x="5527492" y="1348263"/>
             <a:ext cx="1083750" cy="393700"/>
           </a:xfrm>
           <a:prstGeom prst="rect">
@@ -4229,7 +4234,7 @@
         </p:nvSpPr>
         <p:spPr>
           <a:xfrm>
-            <a:off x="6304732" y="1849097"/>
+            <a:off x="5527492" y="1849097"/>
             <a:ext cx="1083750" cy="393700"/>
           </a:xfrm>
           <a:prstGeom prst="rect">
@@ -4278,7 +4283,7 @@
         </p:nvSpPr>
         <p:spPr>
           <a:xfrm>
-            <a:off x="7399220" y="1348263"/>
+            <a:off x="6621980" y="1348263"/>
             <a:ext cx="1083750" cy="938719"/>
           </a:xfrm>
           <a:prstGeom prst="rect">
@@ -4313,7 +4318,7 @@
         </p:nvSpPr>
         <p:spPr>
           <a:xfrm>
-            <a:off x="5607904" y="3633470"/>
+            <a:off x="4830664" y="3633470"/>
             <a:ext cx="2070102" cy="723900"/>
           </a:xfrm>
           <a:prstGeom prst="rect">
@@ -4370,7 +4375,7 @@
         </p:nvSpPr>
         <p:spPr>
           <a:xfrm>
-            <a:off x="6101080" y="3995420"/>
+            <a:off x="5323840" y="3995420"/>
             <a:ext cx="1083750" cy="253184"/>
           </a:xfrm>
           <a:prstGeom prst="rect">
@@ -4419,7 +4424,7 @@
         </p:nvSpPr>
         <p:spPr>
           <a:xfrm>
-            <a:off x="2760980" y="3633470"/>
+            <a:off x="1983740" y="3633470"/>
             <a:ext cx="2070102" cy="723900"/>
           </a:xfrm>
           <a:prstGeom prst="rect">
@@ -4476,7 +4481,7 @@
         </p:nvSpPr>
         <p:spPr>
           <a:xfrm>
-            <a:off x="3242515" y="4019483"/>
+            <a:off x="2465275" y="4019483"/>
             <a:ext cx="1083750" cy="253184"/>
           </a:xfrm>
           <a:prstGeom prst="rect">
@@ -4525,7 +4530,7 @@
         </p:nvGrpSpPr>
         <p:grpSpPr>
           <a:xfrm rot="15993261">
-            <a:off x="5674728" y="2963411"/>
+            <a:off x="4897488" y="2963411"/>
             <a:ext cx="720380" cy="619249"/>
             <a:chOff x="6461366" y="577301"/>
             <a:chExt cx="607772" cy="614077"/>
@@ -4642,7 +4647,7 @@
         </p:nvGrpSpPr>
         <p:grpSpPr>
           <a:xfrm rot="20540969">
-            <a:off x="3910680" y="3008000"/>
+            <a:off x="3133440" y="3008000"/>
             <a:ext cx="720380" cy="619249"/>
             <a:chOff x="6461366" y="577301"/>
             <a:chExt cx="607772" cy="614077"/>
@@ -4745,10 +4750,2660 @@
           </p:txBody>
         </p:sp>
       </p:grpSp>
+      <p:sp>
+        <p:nvSpPr>
+          <p:cNvPr id="2" name="Rectangle 1">
+            <a:extLst>
+              <a:ext uri="{FF2B5EF4-FFF2-40B4-BE49-F238E27FC236}">
+                <a16:creationId xmlns:a16="http://schemas.microsoft.com/office/drawing/2014/main" id="{89B397ED-D56F-40F3-5AAE-DCE243CD7D6E}"/>
+              </a:ext>
+            </a:extLst>
+          </p:cNvPr>
+          <p:cNvSpPr/>
+          <p:nvPr/>
+        </p:nvSpPr>
+        <p:spPr>
+          <a:xfrm>
+            <a:off x="7726585" y="-62230"/>
+            <a:ext cx="1917700" cy="641350"/>
+          </a:xfrm>
+          <a:prstGeom prst="rect">
+            <a:avLst/>
+          </a:prstGeom>
+        </p:spPr>
+        <p:style>
+          <a:lnRef idx="2">
+            <a:schemeClr val="accent1">
+              <a:shade val="15000"/>
+            </a:schemeClr>
+          </a:lnRef>
+          <a:fillRef idx="1">
+            <a:schemeClr val="accent1"/>
+          </a:fillRef>
+          <a:effectRef idx="0">
+            <a:schemeClr val="accent1"/>
+          </a:effectRef>
+          <a:fontRef idx="minor">
+            <a:schemeClr val="lt1"/>
+          </a:fontRef>
+        </p:style>
+        <p:txBody>
+          <a:bodyPr rtlCol="0" anchor="ctr"/>
+          <a:lstStyle/>
+          <a:p>
+            <a:pPr algn="ctr"/>
+            <a:r>
+              <a:rPr lang="en-US" sz="1600" dirty="0"/>
+              <a:t>pyrealsense2</a:t>
+            </a:r>
+          </a:p>
+        </p:txBody>
+      </p:sp>
+      <p:sp>
+        <p:nvSpPr>
+          <p:cNvPr id="7" name="Rectangle 6">
+            <a:extLst>
+              <a:ext uri="{FF2B5EF4-FFF2-40B4-BE49-F238E27FC236}">
+                <a16:creationId xmlns:a16="http://schemas.microsoft.com/office/drawing/2014/main" id="{9E2E2B3D-F6FD-70D0-DE27-FE649AC81794}"/>
+              </a:ext>
+            </a:extLst>
+          </p:cNvPr>
+          <p:cNvSpPr/>
+          <p:nvPr/>
+        </p:nvSpPr>
+        <p:spPr>
+          <a:xfrm>
+            <a:off x="8009160" y="1331595"/>
+            <a:ext cx="1352550" cy="393700"/>
+          </a:xfrm>
+          <a:prstGeom prst="rect">
+            <a:avLst/>
+          </a:prstGeom>
+        </p:spPr>
+        <p:style>
+          <a:lnRef idx="2">
+            <a:schemeClr val="accent2">
+              <a:shade val="15000"/>
+            </a:schemeClr>
+          </a:lnRef>
+          <a:fillRef idx="1">
+            <a:schemeClr val="accent2"/>
+          </a:fillRef>
+          <a:effectRef idx="0">
+            <a:schemeClr val="accent2"/>
+          </a:effectRef>
+          <a:fontRef idx="minor">
+            <a:schemeClr val="lt1"/>
+          </a:fontRef>
+        </p:style>
+        <p:txBody>
+          <a:bodyPr rtlCol="0" anchor="ctr"/>
+          <a:lstStyle/>
+          <a:p>
+            <a:pPr algn="ctr"/>
+            <a:r>
+              <a:rPr lang="en-US" sz="1200" dirty="0"/>
+              <a:t>Camera</a:t>
+            </a:r>
+          </a:p>
+        </p:txBody>
+      </p:sp>
+      <p:sp>
+        <p:nvSpPr>
+          <p:cNvPr id="9" name="Rectangle 8">
+            <a:extLst>
+              <a:ext uri="{FF2B5EF4-FFF2-40B4-BE49-F238E27FC236}">
+                <a16:creationId xmlns:a16="http://schemas.microsoft.com/office/drawing/2014/main" id="{66E9C8F2-43C5-E692-CB25-0B5B58968860}"/>
+              </a:ext>
+            </a:extLst>
+          </p:cNvPr>
+          <p:cNvSpPr/>
+          <p:nvPr/>
+        </p:nvSpPr>
+        <p:spPr>
+          <a:xfrm>
+            <a:off x="8009160" y="2109054"/>
+            <a:ext cx="1352550" cy="546100"/>
+          </a:xfrm>
+          <a:prstGeom prst="rect">
+            <a:avLst/>
+          </a:prstGeom>
+        </p:spPr>
+        <p:style>
+          <a:lnRef idx="2">
+            <a:schemeClr val="accent2">
+              <a:shade val="15000"/>
+            </a:schemeClr>
+          </a:lnRef>
+          <a:fillRef idx="1">
+            <a:schemeClr val="accent2"/>
+          </a:fillRef>
+          <a:effectRef idx="0">
+            <a:schemeClr val="accent2"/>
+          </a:effectRef>
+          <a:fontRef idx="minor">
+            <a:schemeClr val="lt1"/>
+          </a:fontRef>
+        </p:style>
+        <p:txBody>
+          <a:bodyPr rtlCol="0" anchor="ctr"/>
+          <a:lstStyle/>
+          <a:p>
+            <a:pPr algn="ctr"/>
+            <a:r>
+              <a:rPr lang="en-US" sz="1200" dirty="0"/>
+              <a:t>Camera With Recording</a:t>
+            </a:r>
+          </a:p>
+        </p:txBody>
+      </p:sp>
+      <p:grpSp>
+        <p:nvGrpSpPr>
+          <p:cNvPr id="13" name="Group 12">
+            <a:extLst>
+              <a:ext uri="{FF2B5EF4-FFF2-40B4-BE49-F238E27FC236}">
+                <a16:creationId xmlns:a16="http://schemas.microsoft.com/office/drawing/2014/main" id="{C296596A-50F9-A1CD-203E-D5ABD8539073}"/>
+              </a:ext>
+            </a:extLst>
+          </p:cNvPr>
+          <p:cNvGrpSpPr/>
+          <p:nvPr/>
+        </p:nvGrpSpPr>
+        <p:grpSpPr>
+          <a:xfrm rot="18500679">
+            <a:off x="8466917" y="1813040"/>
+            <a:ext cx="319396" cy="193567"/>
+            <a:chOff x="5975045" y="638232"/>
+            <a:chExt cx="309794" cy="186995"/>
+          </a:xfrm>
+        </p:grpSpPr>
+        <p:cxnSp>
+          <p:nvCxnSpPr>
+            <p:cNvPr id="14" name="Straight Arrow Connector 13">
+              <a:extLst>
+                <a:ext uri="{FF2B5EF4-FFF2-40B4-BE49-F238E27FC236}">
+                  <a16:creationId xmlns:a16="http://schemas.microsoft.com/office/drawing/2014/main" id="{08392C56-BE21-3A46-EAAF-E642A1FE9FA8}"/>
+                </a:ext>
+              </a:extLst>
+            </p:cNvPr>
+            <p:cNvCxnSpPr>
+              <a:cxnSpLocks/>
+            </p:cNvCxnSpPr>
+            <p:nvPr/>
+          </p:nvCxnSpPr>
+          <p:spPr>
+            <a:xfrm rot="3099321" flipV="1">
+              <a:off x="6079978" y="720294"/>
+              <a:ext cx="0" cy="209865"/>
+            </a:xfrm>
+            <a:prstGeom prst="straightConnector1">
+              <a:avLst/>
+            </a:prstGeom>
+            <a:ln>
+              <a:headEnd w="lg" len="lg"/>
+              <a:tailEnd type="none" w="lg" len="lg"/>
+            </a:ln>
+          </p:spPr>
+          <p:style>
+            <a:lnRef idx="2">
+              <a:schemeClr val="accent2"/>
+            </a:lnRef>
+            <a:fillRef idx="1">
+              <a:schemeClr val="lt1"/>
+            </a:fillRef>
+            <a:effectRef idx="0">
+              <a:schemeClr val="accent2"/>
+            </a:effectRef>
+            <a:fontRef idx="minor">
+              <a:schemeClr val="dk1"/>
+            </a:fontRef>
+          </p:style>
+        </p:cxnSp>
+        <p:sp>
+          <p:nvSpPr>
+            <p:cNvPr id="15" name="Isosceles Triangle 14">
+              <a:extLst>
+                <a:ext uri="{FF2B5EF4-FFF2-40B4-BE49-F238E27FC236}">
+                  <a16:creationId xmlns:a16="http://schemas.microsoft.com/office/drawing/2014/main" id="{90539E74-3FF6-39FA-C3D7-51D9C716FD8D}"/>
+                </a:ext>
+              </a:extLst>
+            </p:cNvPr>
+            <p:cNvSpPr/>
+            <p:nvPr/>
+          </p:nvSpPr>
+          <p:spPr>
+            <a:xfrm rot="3190820">
+              <a:off x="6137202" y="649344"/>
+              <a:ext cx="158750" cy="136525"/>
+            </a:xfrm>
+            <a:prstGeom prst="triangle">
+              <a:avLst/>
+            </a:prstGeom>
+            <a:ln/>
+          </p:spPr>
+          <p:style>
+            <a:lnRef idx="2">
+              <a:schemeClr val="accent2"/>
+            </a:lnRef>
+            <a:fillRef idx="1">
+              <a:schemeClr val="lt1"/>
+            </a:fillRef>
+            <a:effectRef idx="0">
+              <a:schemeClr val="accent2"/>
+            </a:effectRef>
+            <a:fontRef idx="minor">
+              <a:schemeClr val="dk1"/>
+            </a:fontRef>
+          </p:style>
+          <p:txBody>
+            <a:bodyPr rtlCol="0" anchor="ctr"/>
+            <a:lstStyle/>
+            <a:p>
+              <a:pPr algn="ctr"/>
+              <a:endParaRPr lang="en-US"/>
+            </a:p>
+          </p:txBody>
+        </p:sp>
+      </p:grpSp>
+      <p:cxnSp>
+        <p:nvCxnSpPr>
+          <p:cNvPr id="16" name="Straight Arrow Connector 15">
+            <a:extLst>
+              <a:ext uri="{FF2B5EF4-FFF2-40B4-BE49-F238E27FC236}">
+                <a16:creationId xmlns:a16="http://schemas.microsoft.com/office/drawing/2014/main" id="{DB1A4769-B909-1E85-D6A7-CB319632E74D}"/>
+              </a:ext>
+            </a:extLst>
+          </p:cNvPr>
+          <p:cNvCxnSpPr/>
+          <p:nvPr/>
+        </p:nvCxnSpPr>
+        <p:spPr>
+          <a:xfrm flipV="1">
+            <a:off x="8685435" y="579120"/>
+            <a:ext cx="0" cy="752475"/>
+          </a:xfrm>
+          <a:prstGeom prst="straightConnector1">
+            <a:avLst/>
+          </a:prstGeom>
+          <a:ln>
+            <a:solidFill>
+              <a:schemeClr val="accent2"/>
+            </a:solidFill>
+            <a:prstDash val="dash"/>
+            <a:headEnd type="none" w="med" len="med"/>
+            <a:tailEnd type="arrow" w="med" len="med"/>
+          </a:ln>
+        </p:spPr>
+        <p:style>
+          <a:lnRef idx="2">
+            <a:schemeClr val="accent5"/>
+          </a:lnRef>
+          <a:fillRef idx="0">
+            <a:schemeClr val="accent5"/>
+          </a:fillRef>
+          <a:effectRef idx="1">
+            <a:schemeClr val="accent5"/>
+          </a:effectRef>
+          <a:fontRef idx="minor">
+            <a:schemeClr val="tx1"/>
+          </a:fontRef>
+        </p:style>
+      </p:cxnSp>
+      <p:sp>
+        <p:nvSpPr>
+          <p:cNvPr id="17" name="Rectangle 16">
+            <a:extLst>
+              <a:ext uri="{FF2B5EF4-FFF2-40B4-BE49-F238E27FC236}">
+                <a16:creationId xmlns:a16="http://schemas.microsoft.com/office/drawing/2014/main" id="{6310B114-F106-3956-AF2B-3AEC440812DC}"/>
+              </a:ext>
+            </a:extLst>
+          </p:cNvPr>
+          <p:cNvSpPr/>
+          <p:nvPr/>
+        </p:nvSpPr>
+        <p:spPr>
+          <a:xfrm>
+            <a:off x="10093767" y="1331595"/>
+            <a:ext cx="1352550" cy="443449"/>
+          </a:xfrm>
+          <a:prstGeom prst="rect">
+            <a:avLst/>
+          </a:prstGeom>
+        </p:spPr>
+        <p:style>
+          <a:lnRef idx="2">
+            <a:schemeClr val="accent2">
+              <a:shade val="15000"/>
+            </a:schemeClr>
+          </a:lnRef>
+          <a:fillRef idx="1">
+            <a:schemeClr val="accent2"/>
+          </a:fillRef>
+          <a:effectRef idx="0">
+            <a:schemeClr val="accent2"/>
+          </a:effectRef>
+          <a:fontRef idx="minor">
+            <a:schemeClr val="lt1"/>
+          </a:fontRef>
+        </p:style>
+        <p:txBody>
+          <a:bodyPr rtlCol="0" anchor="ctr"/>
+          <a:lstStyle/>
+          <a:p>
+            <a:pPr algn="ctr"/>
+            <a:r>
+              <a:rPr lang="en-US" sz="1200" dirty="0"/>
+              <a:t>Object Detection</a:t>
+            </a:r>
+          </a:p>
+        </p:txBody>
+      </p:sp>
+      <p:sp>
+        <p:nvSpPr>
+          <p:cNvPr id="18" name="Rectangle 17">
+            <a:extLst>
+              <a:ext uri="{FF2B5EF4-FFF2-40B4-BE49-F238E27FC236}">
+                <a16:creationId xmlns:a16="http://schemas.microsoft.com/office/drawing/2014/main" id="{B1B1E633-21A8-CD6F-A25A-9B73F1E8CB79}"/>
+              </a:ext>
+            </a:extLst>
+          </p:cNvPr>
+          <p:cNvSpPr/>
+          <p:nvPr/>
+        </p:nvSpPr>
+        <p:spPr>
+          <a:xfrm>
+            <a:off x="9811192" y="-62230"/>
+            <a:ext cx="1917700" cy="641350"/>
+          </a:xfrm>
+          <a:prstGeom prst="rect">
+            <a:avLst/>
+          </a:prstGeom>
+        </p:spPr>
+        <p:style>
+          <a:lnRef idx="2">
+            <a:schemeClr val="accent1">
+              <a:shade val="15000"/>
+            </a:schemeClr>
+          </a:lnRef>
+          <a:fillRef idx="1">
+            <a:schemeClr val="accent1"/>
+          </a:fillRef>
+          <a:effectRef idx="0">
+            <a:schemeClr val="accent1"/>
+          </a:effectRef>
+          <a:fontRef idx="minor">
+            <a:schemeClr val="lt1"/>
+          </a:fontRef>
+        </p:style>
+        <p:txBody>
+          <a:bodyPr rtlCol="0" anchor="ctr"/>
+          <a:lstStyle/>
+          <a:p>
+            <a:pPr algn="ctr"/>
+            <a:r>
+              <a:rPr lang="en-US" sz="1600" dirty="0"/>
+              <a:t>YOLO-WORLD</a:t>
+            </a:r>
+            <a:br>
+              <a:rPr lang="en-US" sz="1600" dirty="0"/>
+            </a:br>
+            <a:r>
+              <a:rPr lang="en-US" sz="1200" dirty="0"/>
+              <a:t>(ultralytics)</a:t>
+            </a:r>
+            <a:endParaRPr lang="en-US" sz="1600" dirty="0"/>
+          </a:p>
+        </p:txBody>
+      </p:sp>
+      <p:cxnSp>
+        <p:nvCxnSpPr>
+          <p:cNvPr id="19" name="Straight Arrow Connector 18">
+            <a:extLst>
+              <a:ext uri="{FF2B5EF4-FFF2-40B4-BE49-F238E27FC236}">
+                <a16:creationId xmlns:a16="http://schemas.microsoft.com/office/drawing/2014/main" id="{18342875-0D3C-1565-0294-CB1D2B67C3D9}"/>
+              </a:ext>
+            </a:extLst>
+          </p:cNvPr>
+          <p:cNvCxnSpPr/>
+          <p:nvPr/>
+        </p:nvCxnSpPr>
+        <p:spPr>
+          <a:xfrm flipV="1">
+            <a:off x="10770042" y="579119"/>
+            <a:ext cx="0" cy="752475"/>
+          </a:xfrm>
+          <a:prstGeom prst="straightConnector1">
+            <a:avLst/>
+          </a:prstGeom>
+          <a:ln>
+            <a:solidFill>
+              <a:schemeClr val="accent2"/>
+            </a:solidFill>
+            <a:prstDash val="dash"/>
+            <a:headEnd type="none" w="med" len="med"/>
+            <a:tailEnd type="arrow" w="med" len="med"/>
+          </a:ln>
+        </p:spPr>
+        <p:style>
+          <a:lnRef idx="2">
+            <a:schemeClr val="accent5"/>
+          </a:lnRef>
+          <a:fillRef idx="0">
+            <a:schemeClr val="accent5"/>
+          </a:fillRef>
+          <a:effectRef idx="1">
+            <a:schemeClr val="accent5"/>
+          </a:effectRef>
+          <a:fontRef idx="minor">
+            <a:schemeClr val="tx1"/>
+          </a:fontRef>
+        </p:style>
+      </p:cxnSp>
     </p:spTree>
     <p:extLst>
       <p:ext uri="{BB962C8B-B14F-4D97-AF65-F5344CB8AC3E}">
         <p14:creationId xmlns:p14="http://schemas.microsoft.com/office/powerpoint/2010/main" val="1140170391"/>
+      </p:ext>
+    </p:extLst>
+  </p:cSld>
+  <p:clrMapOvr>
+    <a:masterClrMapping/>
+  </p:clrMapOvr>
+</p:sld>
+</file>
+
+<file path=ppt/slides/slide2.xml><?xml version="1.0" encoding="utf-8"?>
+<p:sld xmlns:a="http://schemas.openxmlformats.org/drawingml/2006/main" xmlns:r="http://schemas.openxmlformats.org/officeDocument/2006/relationships" xmlns:p="http://schemas.openxmlformats.org/presentationml/2006/main">
+  <p:cSld>
+    <p:spTree>
+      <p:nvGrpSpPr>
+        <p:cNvPr id="1" name="">
+          <a:extLst>
+            <a:ext uri="{FF2B5EF4-FFF2-40B4-BE49-F238E27FC236}">
+              <a16:creationId xmlns:a16="http://schemas.microsoft.com/office/drawing/2014/main" id="{663BF71A-4B61-D6E0-B8DE-A546E4BC358A}"/>
+            </a:ext>
+          </a:extLst>
+        </p:cNvPr>
+        <p:cNvGrpSpPr/>
+        <p:nvPr/>
+      </p:nvGrpSpPr>
+      <p:grpSpPr>
+        <a:xfrm>
+          <a:off x="0" y="0"/>
+          <a:ext cx="0" cy="0"/>
+          <a:chOff x="0" y="0"/>
+          <a:chExt cx="0" cy="0"/>
+        </a:xfrm>
+      </p:grpSpPr>
+      <p:sp>
+        <p:nvSpPr>
+          <p:cNvPr id="4" name="Rectangle 3">
+            <a:extLst>
+              <a:ext uri="{FF2B5EF4-FFF2-40B4-BE49-F238E27FC236}">
+                <a16:creationId xmlns:a16="http://schemas.microsoft.com/office/drawing/2014/main" id="{5269907D-A169-A00F-D840-F7B4C8164EC8}"/>
+              </a:ext>
+            </a:extLst>
+          </p:cNvPr>
+          <p:cNvSpPr/>
+          <p:nvPr/>
+        </p:nvSpPr>
+        <p:spPr>
+          <a:xfrm>
+            <a:off x="2307590" y="-62230"/>
+            <a:ext cx="1917700" cy="641350"/>
+          </a:xfrm>
+          <a:prstGeom prst="rect">
+            <a:avLst/>
+          </a:prstGeom>
+        </p:spPr>
+        <p:style>
+          <a:lnRef idx="2">
+            <a:schemeClr val="accent1">
+              <a:shade val="15000"/>
+            </a:schemeClr>
+          </a:lnRef>
+          <a:fillRef idx="1">
+            <a:schemeClr val="accent1"/>
+          </a:fillRef>
+          <a:effectRef idx="0">
+            <a:schemeClr val="accent1"/>
+          </a:effectRef>
+          <a:fontRef idx="minor">
+            <a:schemeClr val="lt1"/>
+          </a:fontRef>
+        </p:style>
+        <p:txBody>
+          <a:bodyPr rtlCol="0" anchor="ctr"/>
+          <a:lstStyle/>
+          <a:p>
+            <a:pPr algn="ctr"/>
+            <a:r>
+              <a:rPr lang="en-US" sz="1600" dirty="0"/>
+              <a:t>ur_rtde control </a:t>
+            </a:r>
+          </a:p>
+        </p:txBody>
+      </p:sp>
+      <p:sp>
+        <p:nvSpPr>
+          <p:cNvPr id="5" name="Rectangle 4">
+            <a:extLst>
+              <a:ext uri="{FF2B5EF4-FFF2-40B4-BE49-F238E27FC236}">
+                <a16:creationId xmlns:a16="http://schemas.microsoft.com/office/drawing/2014/main" id="{EE0ABFBA-0824-086C-0157-AA25CB5C8C6E}"/>
+              </a:ext>
+            </a:extLst>
+          </p:cNvPr>
+          <p:cNvSpPr/>
+          <p:nvPr/>
+        </p:nvSpPr>
+        <p:spPr>
+          <a:xfrm>
+            <a:off x="4276092" y="-62230"/>
+            <a:ext cx="1917700" cy="641350"/>
+          </a:xfrm>
+          <a:prstGeom prst="rect">
+            <a:avLst/>
+          </a:prstGeom>
+        </p:spPr>
+        <p:style>
+          <a:lnRef idx="2">
+            <a:schemeClr val="accent1">
+              <a:shade val="15000"/>
+            </a:schemeClr>
+          </a:lnRef>
+          <a:fillRef idx="1">
+            <a:schemeClr val="accent1"/>
+          </a:fillRef>
+          <a:effectRef idx="0">
+            <a:schemeClr val="accent1"/>
+          </a:effectRef>
+          <a:fontRef idx="minor">
+            <a:schemeClr val="lt1"/>
+          </a:fontRef>
+        </p:style>
+        <p:txBody>
+          <a:bodyPr rtlCol="0" anchor="ctr"/>
+          <a:lstStyle/>
+          <a:p>
+            <a:pPr algn="ctr"/>
+            <a:r>
+              <a:rPr lang="en-US" sz="1600" dirty="0"/>
+              <a:t>ur_rtde Receive </a:t>
+            </a:r>
+          </a:p>
+        </p:txBody>
+      </p:sp>
+      <p:sp>
+        <p:nvSpPr>
+          <p:cNvPr id="6" name="Rectangle 5">
+            <a:extLst>
+              <a:ext uri="{FF2B5EF4-FFF2-40B4-BE49-F238E27FC236}">
+                <a16:creationId xmlns:a16="http://schemas.microsoft.com/office/drawing/2014/main" id="{D8FB3096-CF0C-79EC-AB5D-DE024348E2D5}"/>
+              </a:ext>
+            </a:extLst>
+          </p:cNvPr>
+          <p:cNvSpPr/>
+          <p:nvPr/>
+        </p:nvSpPr>
+        <p:spPr>
+          <a:xfrm>
+            <a:off x="3574415" y="1366520"/>
+            <a:ext cx="1352550" cy="393700"/>
+          </a:xfrm>
+          <a:prstGeom prst="rect">
+            <a:avLst/>
+          </a:prstGeom>
+        </p:spPr>
+        <p:style>
+          <a:lnRef idx="2">
+            <a:schemeClr val="accent3">
+              <a:shade val="15000"/>
+            </a:schemeClr>
+          </a:lnRef>
+          <a:fillRef idx="1">
+            <a:schemeClr val="accent3"/>
+          </a:fillRef>
+          <a:effectRef idx="0">
+            <a:schemeClr val="accent3"/>
+          </a:effectRef>
+          <a:fontRef idx="minor">
+            <a:schemeClr val="lt1"/>
+          </a:fontRef>
+        </p:style>
+        <p:txBody>
+          <a:bodyPr rtlCol="0" anchor="ctr"/>
+          <a:lstStyle/>
+          <a:p>
+            <a:pPr algn="ctr"/>
+            <a:r>
+              <a:rPr lang="en-US" sz="1200" dirty="0"/>
+              <a:t>Robot Interface</a:t>
+            </a:r>
+          </a:p>
+        </p:txBody>
+      </p:sp>
+      <p:sp>
+        <p:nvSpPr>
+          <p:cNvPr id="21" name="Rectangle 20">
+            <a:extLst>
+              <a:ext uri="{FF2B5EF4-FFF2-40B4-BE49-F238E27FC236}">
+                <a16:creationId xmlns:a16="http://schemas.microsoft.com/office/drawing/2014/main" id="{87C54D2B-4E14-93B9-29E2-F01663F274FA}"/>
+              </a:ext>
+            </a:extLst>
+          </p:cNvPr>
+          <p:cNvSpPr/>
+          <p:nvPr/>
+        </p:nvSpPr>
+        <p:spPr>
+          <a:xfrm>
+            <a:off x="66040" y="-62230"/>
+            <a:ext cx="1917700" cy="641350"/>
+          </a:xfrm>
+          <a:prstGeom prst="rect">
+            <a:avLst/>
+          </a:prstGeom>
+        </p:spPr>
+        <p:style>
+          <a:lnRef idx="2">
+            <a:schemeClr val="accent1">
+              <a:shade val="15000"/>
+            </a:schemeClr>
+          </a:lnRef>
+          <a:fillRef idx="1">
+            <a:schemeClr val="accent1"/>
+          </a:fillRef>
+          <a:effectRef idx="0">
+            <a:schemeClr val="accent1"/>
+          </a:effectRef>
+          <a:fontRef idx="minor">
+            <a:schemeClr val="lt1"/>
+          </a:fontRef>
+        </p:style>
+        <p:txBody>
+          <a:bodyPr rtlCol="0" anchor="ctr"/>
+          <a:lstStyle/>
+          <a:p>
+            <a:pPr algn="ctr"/>
+            <a:r>
+              <a:rPr lang="en-US" sz="1600" dirty="0"/>
+              <a:t>KLAMPT</a:t>
+            </a:r>
+          </a:p>
+        </p:txBody>
+      </p:sp>
+      <p:grpSp>
+        <p:nvGrpSpPr>
+          <p:cNvPr id="31" name="Group 30">
+            <a:extLst>
+              <a:ext uri="{FF2B5EF4-FFF2-40B4-BE49-F238E27FC236}">
+                <a16:creationId xmlns:a16="http://schemas.microsoft.com/office/drawing/2014/main" id="{25A46EB7-E896-667A-DBB1-28C47B087478}"/>
+              </a:ext>
+            </a:extLst>
+          </p:cNvPr>
+          <p:cNvGrpSpPr/>
+          <p:nvPr/>
+        </p:nvGrpSpPr>
+        <p:grpSpPr>
+          <a:xfrm>
+            <a:off x="4250690" y="556895"/>
+            <a:ext cx="1003300" cy="825500"/>
+            <a:chOff x="6096000" y="577301"/>
+            <a:chExt cx="973138" cy="797474"/>
+          </a:xfrm>
+        </p:grpSpPr>
+        <p:cxnSp>
+          <p:nvCxnSpPr>
+            <p:cNvPr id="8" name="Straight Arrow Connector 7">
+              <a:extLst>
+                <a:ext uri="{FF2B5EF4-FFF2-40B4-BE49-F238E27FC236}">
+                  <a16:creationId xmlns:a16="http://schemas.microsoft.com/office/drawing/2014/main" id="{C1D7497E-6AB2-3A05-2C01-A344C8842ABE}"/>
+                </a:ext>
+              </a:extLst>
+            </p:cNvPr>
+            <p:cNvCxnSpPr>
+              <a:cxnSpLocks/>
+            </p:cNvCxnSpPr>
+            <p:nvPr/>
+          </p:nvCxnSpPr>
+          <p:spPr>
+            <a:xfrm flipV="1">
+              <a:off x="6096000" y="695325"/>
+              <a:ext cx="854075" cy="679450"/>
+            </a:xfrm>
+            <a:prstGeom prst="straightConnector1">
+              <a:avLst/>
+            </a:prstGeom>
+            <a:ln>
+              <a:headEnd w="lg" len="lg"/>
+              <a:tailEnd type="none" w="lg" len="lg"/>
+            </a:ln>
+          </p:spPr>
+          <p:style>
+            <a:lnRef idx="2">
+              <a:schemeClr val="accent3"/>
+            </a:lnRef>
+            <a:fillRef idx="0">
+              <a:schemeClr val="accent3"/>
+            </a:fillRef>
+            <a:effectRef idx="1">
+              <a:schemeClr val="accent3"/>
+            </a:effectRef>
+            <a:fontRef idx="minor">
+              <a:schemeClr val="tx1"/>
+            </a:fontRef>
+          </p:style>
+        </p:cxnSp>
+        <p:sp>
+          <p:nvSpPr>
+            <p:cNvPr id="29" name="Isosceles Triangle 28">
+              <a:extLst>
+                <a:ext uri="{FF2B5EF4-FFF2-40B4-BE49-F238E27FC236}">
+                  <a16:creationId xmlns:a16="http://schemas.microsoft.com/office/drawing/2014/main" id="{06DFA1A0-6B61-1BDF-36CC-7C2FCD5842E8}"/>
+                </a:ext>
+              </a:extLst>
+            </p:cNvPr>
+            <p:cNvSpPr/>
+            <p:nvPr/>
+          </p:nvSpPr>
+          <p:spPr>
+            <a:xfrm rot="2877949">
+              <a:off x="6921501" y="588413"/>
+              <a:ext cx="158750" cy="136525"/>
+            </a:xfrm>
+            <a:prstGeom prst="triangle">
+              <a:avLst/>
+            </a:prstGeom>
+            <a:noFill/>
+            <a:ln>
+              <a:solidFill>
+                <a:schemeClr val="accent3">
+                  <a:lumMod val="75000"/>
+                </a:schemeClr>
+              </a:solidFill>
+            </a:ln>
+          </p:spPr>
+          <p:style>
+            <a:lnRef idx="2">
+              <a:schemeClr val="accent3">
+                <a:shade val="15000"/>
+              </a:schemeClr>
+            </a:lnRef>
+            <a:fillRef idx="1">
+              <a:schemeClr val="accent3"/>
+            </a:fillRef>
+            <a:effectRef idx="0">
+              <a:schemeClr val="accent3"/>
+            </a:effectRef>
+            <a:fontRef idx="minor">
+              <a:schemeClr val="lt1"/>
+            </a:fontRef>
+          </p:style>
+          <p:txBody>
+            <a:bodyPr rtlCol="0" anchor="ctr"/>
+            <a:lstStyle/>
+            <a:p>
+              <a:pPr algn="ctr"/>
+              <a:endParaRPr lang="en-US"/>
+            </a:p>
+          </p:txBody>
+        </p:sp>
+      </p:grpSp>
+      <p:grpSp>
+        <p:nvGrpSpPr>
+          <p:cNvPr id="32" name="Group 31">
+            <a:extLst>
+              <a:ext uri="{FF2B5EF4-FFF2-40B4-BE49-F238E27FC236}">
+                <a16:creationId xmlns:a16="http://schemas.microsoft.com/office/drawing/2014/main" id="{4B4CB155-DCDA-ADF3-F561-C3C5DFAADDED}"/>
+              </a:ext>
+            </a:extLst>
+          </p:cNvPr>
+          <p:cNvGrpSpPr/>
+          <p:nvPr/>
+        </p:nvGrpSpPr>
+        <p:grpSpPr>
+          <a:xfrm rot="15402771">
+            <a:off x="3257446" y="567535"/>
+            <a:ext cx="1003300" cy="825500"/>
+            <a:chOff x="6096000" y="577301"/>
+            <a:chExt cx="973138" cy="797474"/>
+          </a:xfrm>
+        </p:grpSpPr>
+        <p:cxnSp>
+          <p:nvCxnSpPr>
+            <p:cNvPr id="33" name="Straight Arrow Connector 32">
+              <a:extLst>
+                <a:ext uri="{FF2B5EF4-FFF2-40B4-BE49-F238E27FC236}">
+                  <a16:creationId xmlns:a16="http://schemas.microsoft.com/office/drawing/2014/main" id="{036A3E31-2C86-9543-0188-6A2F210BF774}"/>
+                </a:ext>
+              </a:extLst>
+            </p:cNvPr>
+            <p:cNvCxnSpPr>
+              <a:cxnSpLocks/>
+            </p:cNvCxnSpPr>
+            <p:nvPr/>
+          </p:nvCxnSpPr>
+          <p:spPr>
+            <a:xfrm flipV="1">
+              <a:off x="6096000" y="695325"/>
+              <a:ext cx="854075" cy="679450"/>
+            </a:xfrm>
+            <a:prstGeom prst="straightConnector1">
+              <a:avLst/>
+            </a:prstGeom>
+            <a:ln>
+              <a:headEnd w="lg" len="lg"/>
+              <a:tailEnd type="none" w="lg" len="lg"/>
+            </a:ln>
+          </p:spPr>
+          <p:style>
+            <a:lnRef idx="2">
+              <a:schemeClr val="accent3"/>
+            </a:lnRef>
+            <a:fillRef idx="0">
+              <a:schemeClr val="accent3"/>
+            </a:fillRef>
+            <a:effectRef idx="1">
+              <a:schemeClr val="accent3"/>
+            </a:effectRef>
+            <a:fontRef idx="minor">
+              <a:schemeClr val="tx1"/>
+            </a:fontRef>
+          </p:style>
+        </p:cxnSp>
+        <p:sp>
+          <p:nvSpPr>
+            <p:cNvPr id="34" name="Isosceles Triangle 33">
+              <a:extLst>
+                <a:ext uri="{FF2B5EF4-FFF2-40B4-BE49-F238E27FC236}">
+                  <a16:creationId xmlns:a16="http://schemas.microsoft.com/office/drawing/2014/main" id="{65223A3B-10F8-F1D3-78E6-BBD99B3097E7}"/>
+                </a:ext>
+              </a:extLst>
+            </p:cNvPr>
+            <p:cNvSpPr/>
+            <p:nvPr/>
+          </p:nvSpPr>
+          <p:spPr>
+            <a:xfrm rot="2877949">
+              <a:off x="6921501" y="588413"/>
+              <a:ext cx="158750" cy="136525"/>
+            </a:xfrm>
+            <a:prstGeom prst="triangle">
+              <a:avLst/>
+            </a:prstGeom>
+            <a:noFill/>
+            <a:ln>
+              <a:solidFill>
+                <a:schemeClr val="accent3">
+                  <a:lumMod val="75000"/>
+                </a:schemeClr>
+              </a:solidFill>
+            </a:ln>
+          </p:spPr>
+          <p:style>
+            <a:lnRef idx="2">
+              <a:schemeClr val="accent3">
+                <a:shade val="15000"/>
+              </a:schemeClr>
+            </a:lnRef>
+            <a:fillRef idx="1">
+              <a:schemeClr val="accent3"/>
+            </a:fillRef>
+            <a:effectRef idx="0">
+              <a:schemeClr val="accent3"/>
+            </a:effectRef>
+            <a:fontRef idx="minor">
+              <a:schemeClr val="lt1"/>
+            </a:fontRef>
+          </p:style>
+          <p:txBody>
+            <a:bodyPr rtlCol="0" anchor="ctr"/>
+            <a:lstStyle/>
+            <a:p>
+              <a:pPr algn="ctr"/>
+              <a:endParaRPr lang="en-US"/>
+            </a:p>
+          </p:txBody>
+        </p:sp>
+      </p:grpSp>
+      <p:sp>
+        <p:nvSpPr>
+          <p:cNvPr id="35" name="Rectangle 34">
+            <a:extLst>
+              <a:ext uri="{FF2B5EF4-FFF2-40B4-BE49-F238E27FC236}">
+                <a16:creationId xmlns:a16="http://schemas.microsoft.com/office/drawing/2014/main" id="{EBA9F1DA-208E-966A-F731-7FC03E3B2F17}"/>
+              </a:ext>
+            </a:extLst>
+          </p:cNvPr>
+          <p:cNvSpPr/>
+          <p:nvPr/>
+        </p:nvSpPr>
+        <p:spPr>
+          <a:xfrm>
+            <a:off x="348615" y="1331595"/>
+            <a:ext cx="1352550" cy="393700"/>
+          </a:xfrm>
+          <a:prstGeom prst="rect">
+            <a:avLst/>
+          </a:prstGeom>
+        </p:spPr>
+        <p:style>
+          <a:lnRef idx="2">
+            <a:schemeClr val="accent5">
+              <a:shade val="15000"/>
+            </a:schemeClr>
+          </a:lnRef>
+          <a:fillRef idx="1">
+            <a:schemeClr val="accent5"/>
+          </a:fillRef>
+          <a:effectRef idx="0">
+            <a:schemeClr val="accent5"/>
+          </a:effectRef>
+          <a:fontRef idx="minor">
+            <a:schemeClr val="lt1"/>
+          </a:fontRef>
+        </p:style>
+        <p:txBody>
+          <a:bodyPr rtlCol="0" anchor="ctr"/>
+          <a:lstStyle/>
+          <a:p>
+            <a:pPr algn="ctr"/>
+            <a:r>
+              <a:rPr lang="en-US" sz="1200" dirty="0"/>
+              <a:t>Motion Planner</a:t>
+            </a:r>
+          </a:p>
+        </p:txBody>
+      </p:sp>
+      <p:cxnSp>
+        <p:nvCxnSpPr>
+          <p:cNvPr id="37" name="Straight Arrow Connector 36">
+            <a:extLst>
+              <a:ext uri="{FF2B5EF4-FFF2-40B4-BE49-F238E27FC236}">
+                <a16:creationId xmlns:a16="http://schemas.microsoft.com/office/drawing/2014/main" id="{DE00C21B-BF1B-0997-C8F6-DA695365E3D2}"/>
+              </a:ext>
+            </a:extLst>
+          </p:cNvPr>
+          <p:cNvCxnSpPr>
+            <a:stCxn id="35" idx="0"/>
+            <a:endCxn id="21" idx="2"/>
+          </p:cNvCxnSpPr>
+          <p:nvPr/>
+        </p:nvCxnSpPr>
+        <p:spPr>
+          <a:xfrm flipV="1">
+            <a:off x="1024890" y="579120"/>
+            <a:ext cx="0" cy="752475"/>
+          </a:xfrm>
+          <a:prstGeom prst="straightConnector1">
+            <a:avLst/>
+          </a:prstGeom>
+          <a:ln>
+            <a:prstDash val="dash"/>
+            <a:headEnd type="none" w="med" len="med"/>
+            <a:tailEnd type="arrow" w="med" len="med"/>
+          </a:ln>
+        </p:spPr>
+        <p:style>
+          <a:lnRef idx="2">
+            <a:schemeClr val="accent5"/>
+          </a:lnRef>
+          <a:fillRef idx="0">
+            <a:schemeClr val="accent5"/>
+          </a:fillRef>
+          <a:effectRef idx="1">
+            <a:schemeClr val="accent5"/>
+          </a:effectRef>
+          <a:fontRef idx="minor">
+            <a:schemeClr val="tx1"/>
+          </a:fontRef>
+        </p:style>
+      </p:cxnSp>
+      <p:sp>
+        <p:nvSpPr>
+          <p:cNvPr id="38" name="Rectangle 37">
+            <a:extLst>
+              <a:ext uri="{FF2B5EF4-FFF2-40B4-BE49-F238E27FC236}">
+                <a16:creationId xmlns:a16="http://schemas.microsoft.com/office/drawing/2014/main" id="{F7F72DFC-BE4E-D2BF-3B2F-4006D2CDCDA3}"/>
+              </a:ext>
+            </a:extLst>
+          </p:cNvPr>
+          <p:cNvSpPr/>
+          <p:nvPr/>
+        </p:nvSpPr>
+        <p:spPr>
+          <a:xfrm>
+            <a:off x="3389214" y="2146048"/>
+            <a:ext cx="1812923" cy="785748"/>
+          </a:xfrm>
+          <a:prstGeom prst="rect">
+            <a:avLst/>
+          </a:prstGeom>
+        </p:spPr>
+        <p:style>
+          <a:lnRef idx="2">
+            <a:schemeClr val="accent3">
+              <a:shade val="15000"/>
+            </a:schemeClr>
+          </a:lnRef>
+          <a:fillRef idx="1">
+            <a:schemeClr val="accent3"/>
+          </a:fillRef>
+          <a:effectRef idx="0">
+            <a:schemeClr val="accent3"/>
+          </a:effectRef>
+          <a:fontRef idx="minor">
+            <a:schemeClr val="lt1"/>
+          </a:fontRef>
+        </p:style>
+        <p:txBody>
+          <a:bodyPr rtlCol="0" anchor="ctr"/>
+          <a:lstStyle/>
+          <a:p>
+            <a:pPr algn="ctr"/>
+            <a:r>
+              <a:rPr lang="en-US" sz="1200" dirty="0"/>
+              <a:t>Robot Interface With MP</a:t>
+            </a:r>
+          </a:p>
+          <a:p>
+            <a:pPr algn="ctr"/>
+            <a:endParaRPr lang="en-US" sz="1200" dirty="0"/>
+          </a:p>
+          <a:p>
+            <a:pPr algn="ctr"/>
+            <a:endParaRPr lang="en-US" sz="1200" dirty="0"/>
+          </a:p>
+        </p:txBody>
+      </p:sp>
+      <p:sp>
+        <p:nvSpPr>
+          <p:cNvPr id="39" name="Rectangle 38">
+            <a:extLst>
+              <a:ext uri="{FF2B5EF4-FFF2-40B4-BE49-F238E27FC236}">
+                <a16:creationId xmlns:a16="http://schemas.microsoft.com/office/drawing/2014/main" id="{4BBA6507-002E-D1B3-06D8-340EFF8B6179}"/>
+              </a:ext>
+            </a:extLst>
+          </p:cNvPr>
+          <p:cNvSpPr/>
+          <p:nvPr/>
+        </p:nvSpPr>
+        <p:spPr>
+          <a:xfrm>
+            <a:off x="3459593" y="2597908"/>
+            <a:ext cx="790045" cy="239961"/>
+          </a:xfrm>
+          <a:prstGeom prst="rect">
+            <a:avLst/>
+          </a:prstGeom>
+        </p:spPr>
+        <p:style>
+          <a:lnRef idx="2">
+            <a:schemeClr val="accent5">
+              <a:shade val="15000"/>
+            </a:schemeClr>
+          </a:lnRef>
+          <a:fillRef idx="1">
+            <a:schemeClr val="accent5"/>
+          </a:fillRef>
+          <a:effectRef idx="0">
+            <a:schemeClr val="accent5"/>
+          </a:effectRef>
+          <a:fontRef idx="minor">
+            <a:schemeClr val="lt1"/>
+          </a:fontRef>
+        </p:style>
+        <p:txBody>
+          <a:bodyPr rtlCol="0" anchor="ctr"/>
+          <a:lstStyle/>
+          <a:p>
+            <a:pPr algn="ctr"/>
+            <a:r>
+              <a:rPr lang="en-US" sz="800" dirty="0"/>
+              <a:t>Motion Planner</a:t>
+            </a:r>
+          </a:p>
+        </p:txBody>
+      </p:sp>
+      <p:sp>
+        <p:nvSpPr>
+          <p:cNvPr id="40" name="Rectangle 39">
+            <a:extLst>
+              <a:ext uri="{FF2B5EF4-FFF2-40B4-BE49-F238E27FC236}">
+                <a16:creationId xmlns:a16="http://schemas.microsoft.com/office/drawing/2014/main" id="{EEBAEC43-A04B-5AA4-6EA5-3F446BE4B46E}"/>
+              </a:ext>
+            </a:extLst>
+          </p:cNvPr>
+          <p:cNvSpPr/>
+          <p:nvPr/>
+        </p:nvSpPr>
+        <p:spPr>
+          <a:xfrm>
+            <a:off x="348616" y="1734820"/>
+            <a:ext cx="1352550" cy="393700"/>
+          </a:xfrm>
+          <a:prstGeom prst="rect">
+            <a:avLst/>
+          </a:prstGeom>
+        </p:spPr>
+        <p:style>
+          <a:lnRef idx="2">
+            <a:schemeClr val="accent5">
+              <a:shade val="15000"/>
+            </a:schemeClr>
+          </a:lnRef>
+          <a:fillRef idx="1">
+            <a:schemeClr val="accent5"/>
+          </a:fillRef>
+          <a:effectRef idx="0">
+            <a:schemeClr val="accent5"/>
+          </a:effectRef>
+          <a:fontRef idx="minor">
+            <a:schemeClr val="lt1"/>
+          </a:fontRef>
+        </p:style>
+        <p:txBody>
+          <a:bodyPr rtlCol="0" anchor="ctr"/>
+          <a:lstStyle/>
+          <a:p>
+            <a:pPr algn="ctr"/>
+            <a:r>
+              <a:rPr lang="en-US" sz="1200" dirty="0"/>
+              <a:t>Geometry and Transforms</a:t>
+            </a:r>
+          </a:p>
+        </p:txBody>
+      </p:sp>
+      <p:sp>
+        <p:nvSpPr>
+          <p:cNvPr id="41" name="Rectangle 40">
+            <a:extLst>
+              <a:ext uri="{FF2B5EF4-FFF2-40B4-BE49-F238E27FC236}">
+                <a16:creationId xmlns:a16="http://schemas.microsoft.com/office/drawing/2014/main" id="{9044892E-E08E-A1C1-2298-2318DB34C200}"/>
+              </a:ext>
+            </a:extLst>
+          </p:cNvPr>
+          <p:cNvSpPr/>
+          <p:nvPr/>
+        </p:nvSpPr>
+        <p:spPr>
+          <a:xfrm>
+            <a:off x="4289589" y="2597907"/>
+            <a:ext cx="872596" cy="239961"/>
+          </a:xfrm>
+          <a:prstGeom prst="rect">
+            <a:avLst/>
+          </a:prstGeom>
+        </p:spPr>
+        <p:style>
+          <a:lnRef idx="2">
+            <a:schemeClr val="accent5">
+              <a:shade val="15000"/>
+            </a:schemeClr>
+          </a:lnRef>
+          <a:fillRef idx="1">
+            <a:schemeClr val="accent5"/>
+          </a:fillRef>
+          <a:effectRef idx="0">
+            <a:schemeClr val="accent5"/>
+          </a:effectRef>
+          <a:fontRef idx="minor">
+            <a:schemeClr val="lt1"/>
+          </a:fontRef>
+        </p:style>
+        <p:txBody>
+          <a:bodyPr rtlCol="0" anchor="ctr"/>
+          <a:lstStyle/>
+          <a:p>
+            <a:pPr algn="ctr"/>
+            <a:r>
+              <a:rPr lang="en-US" sz="800" dirty="0"/>
+              <a:t>Geometry and Transforms</a:t>
+            </a:r>
+          </a:p>
+        </p:txBody>
+      </p:sp>
+      <p:grpSp>
+        <p:nvGrpSpPr>
+          <p:cNvPr id="42" name="Group 41">
+            <a:extLst>
+              <a:ext uri="{FF2B5EF4-FFF2-40B4-BE49-F238E27FC236}">
+                <a16:creationId xmlns:a16="http://schemas.microsoft.com/office/drawing/2014/main" id="{B50A83C4-8F5E-08AE-E143-6203498AAA88}"/>
+              </a:ext>
+            </a:extLst>
+          </p:cNvPr>
+          <p:cNvGrpSpPr/>
+          <p:nvPr/>
+        </p:nvGrpSpPr>
+        <p:grpSpPr>
+          <a:xfrm rot="18500679">
+            <a:off x="4114337" y="1829924"/>
+            <a:ext cx="319396" cy="193567"/>
+            <a:chOff x="5975045" y="638232"/>
+            <a:chExt cx="309794" cy="186995"/>
+          </a:xfrm>
+        </p:grpSpPr>
+        <p:cxnSp>
+          <p:nvCxnSpPr>
+            <p:cNvPr id="43" name="Straight Arrow Connector 42">
+              <a:extLst>
+                <a:ext uri="{FF2B5EF4-FFF2-40B4-BE49-F238E27FC236}">
+                  <a16:creationId xmlns:a16="http://schemas.microsoft.com/office/drawing/2014/main" id="{48453716-856F-8D94-B5B8-6B90D691248F}"/>
+                </a:ext>
+              </a:extLst>
+            </p:cNvPr>
+            <p:cNvCxnSpPr>
+              <a:cxnSpLocks/>
+            </p:cNvCxnSpPr>
+            <p:nvPr/>
+          </p:nvCxnSpPr>
+          <p:spPr>
+            <a:xfrm rot="3099321" flipV="1">
+              <a:off x="6079978" y="720294"/>
+              <a:ext cx="0" cy="209865"/>
+            </a:xfrm>
+            <a:prstGeom prst="straightConnector1">
+              <a:avLst/>
+            </a:prstGeom>
+            <a:ln>
+              <a:headEnd w="lg" len="lg"/>
+              <a:tailEnd type="none" w="lg" len="lg"/>
+            </a:ln>
+          </p:spPr>
+          <p:style>
+            <a:lnRef idx="2">
+              <a:schemeClr val="accent3"/>
+            </a:lnRef>
+            <a:fillRef idx="0">
+              <a:schemeClr val="accent3"/>
+            </a:fillRef>
+            <a:effectRef idx="1">
+              <a:schemeClr val="accent3"/>
+            </a:effectRef>
+            <a:fontRef idx="minor">
+              <a:schemeClr val="tx1"/>
+            </a:fontRef>
+          </p:style>
+        </p:cxnSp>
+        <p:sp>
+          <p:nvSpPr>
+            <p:cNvPr id="44" name="Isosceles Triangle 43">
+              <a:extLst>
+                <a:ext uri="{FF2B5EF4-FFF2-40B4-BE49-F238E27FC236}">
+                  <a16:creationId xmlns:a16="http://schemas.microsoft.com/office/drawing/2014/main" id="{6CB83750-6C44-4F17-5C2C-7BB9DC489B66}"/>
+                </a:ext>
+              </a:extLst>
+            </p:cNvPr>
+            <p:cNvSpPr/>
+            <p:nvPr/>
+          </p:nvSpPr>
+          <p:spPr>
+            <a:xfrm rot="3190820">
+              <a:off x="6137202" y="649344"/>
+              <a:ext cx="158750" cy="136525"/>
+            </a:xfrm>
+            <a:prstGeom prst="triangle">
+              <a:avLst/>
+            </a:prstGeom>
+            <a:noFill/>
+            <a:ln>
+              <a:solidFill>
+                <a:schemeClr val="accent3">
+                  <a:lumMod val="75000"/>
+                </a:schemeClr>
+              </a:solidFill>
+            </a:ln>
+          </p:spPr>
+          <p:style>
+            <a:lnRef idx="2">
+              <a:schemeClr val="accent3">
+                <a:shade val="15000"/>
+              </a:schemeClr>
+            </a:lnRef>
+            <a:fillRef idx="1">
+              <a:schemeClr val="accent3"/>
+            </a:fillRef>
+            <a:effectRef idx="0">
+              <a:schemeClr val="accent3"/>
+            </a:effectRef>
+            <a:fontRef idx="minor">
+              <a:schemeClr val="lt1"/>
+            </a:fontRef>
+          </p:style>
+          <p:txBody>
+            <a:bodyPr rtlCol="0" anchor="ctr"/>
+            <a:lstStyle/>
+            <a:p>
+              <a:pPr algn="ctr"/>
+              <a:endParaRPr lang="en-US"/>
+            </a:p>
+          </p:txBody>
+        </p:sp>
+      </p:grpSp>
+      <p:sp>
+        <p:nvSpPr>
+          <p:cNvPr id="47" name="Rectangle 46">
+            <a:extLst>
+              <a:ext uri="{FF2B5EF4-FFF2-40B4-BE49-F238E27FC236}">
+                <a16:creationId xmlns:a16="http://schemas.microsoft.com/office/drawing/2014/main" id="{B8C0A775-FB50-8823-28DB-AAC108AC805C}"/>
+              </a:ext>
+            </a:extLst>
+          </p:cNvPr>
+          <p:cNvSpPr/>
+          <p:nvPr/>
+        </p:nvSpPr>
+        <p:spPr>
+          <a:xfrm>
+            <a:off x="5527492" y="1348263"/>
+            <a:ext cx="1083750" cy="393700"/>
+          </a:xfrm>
+          <a:prstGeom prst="rect">
+            <a:avLst/>
+          </a:prstGeom>
+        </p:spPr>
+        <p:style>
+          <a:lnRef idx="2">
+            <a:schemeClr val="accent3">
+              <a:shade val="15000"/>
+            </a:schemeClr>
+          </a:lnRef>
+          <a:fillRef idx="1">
+            <a:schemeClr val="accent3"/>
+          </a:fillRef>
+          <a:effectRef idx="0">
+            <a:schemeClr val="accent3"/>
+          </a:effectRef>
+          <a:fontRef idx="minor">
+            <a:schemeClr val="lt1"/>
+          </a:fontRef>
+        </p:style>
+        <p:txBody>
+          <a:bodyPr rtlCol="0" anchor="ctr"/>
+          <a:lstStyle/>
+          <a:p>
+            <a:pPr algn="ctr"/>
+            <a:r>
+              <a:rPr lang="en-US" sz="1200" dirty="0"/>
+              <a:t>Two Finger Gripper</a:t>
+            </a:r>
+          </a:p>
+        </p:txBody>
+      </p:sp>
+      <p:sp>
+        <p:nvSpPr>
+          <p:cNvPr id="48" name="Rectangle 47">
+            <a:extLst>
+              <a:ext uri="{FF2B5EF4-FFF2-40B4-BE49-F238E27FC236}">
+                <a16:creationId xmlns:a16="http://schemas.microsoft.com/office/drawing/2014/main" id="{CF41097A-3BB1-5716-32DD-EE63E560B776}"/>
+              </a:ext>
+            </a:extLst>
+          </p:cNvPr>
+          <p:cNvSpPr/>
+          <p:nvPr/>
+        </p:nvSpPr>
+        <p:spPr>
+          <a:xfrm>
+            <a:off x="5527492" y="1849097"/>
+            <a:ext cx="1083750" cy="393700"/>
+          </a:xfrm>
+          <a:prstGeom prst="rect">
+            <a:avLst/>
+          </a:prstGeom>
+        </p:spPr>
+        <p:style>
+          <a:lnRef idx="2">
+            <a:schemeClr val="accent3">
+              <a:shade val="15000"/>
+            </a:schemeClr>
+          </a:lnRef>
+          <a:fillRef idx="1">
+            <a:schemeClr val="accent3"/>
+          </a:fillRef>
+          <a:effectRef idx="0">
+            <a:schemeClr val="accent3"/>
+          </a:effectRef>
+          <a:fontRef idx="minor">
+            <a:schemeClr val="lt1"/>
+          </a:fontRef>
+        </p:style>
+        <p:txBody>
+          <a:bodyPr rtlCol="0" anchor="ctr"/>
+          <a:lstStyle/>
+          <a:p>
+            <a:pPr algn="ctr"/>
+            <a:r>
+              <a:rPr lang="en-US" sz="1200" dirty="0"/>
+              <a:t>Vacuum Gripper</a:t>
+            </a:r>
+          </a:p>
+        </p:txBody>
+      </p:sp>
+      <p:sp>
+        <p:nvSpPr>
+          <p:cNvPr id="49" name="TextBox 48">
+            <a:extLst>
+              <a:ext uri="{FF2B5EF4-FFF2-40B4-BE49-F238E27FC236}">
+                <a16:creationId xmlns:a16="http://schemas.microsoft.com/office/drawing/2014/main" id="{A8EB4637-5CC8-71A8-3F44-5CAFF53B9F49}"/>
+              </a:ext>
+            </a:extLst>
+          </p:cNvPr>
+          <p:cNvSpPr txBox="1"/>
+          <p:nvPr/>
+        </p:nvSpPr>
+        <p:spPr>
+          <a:xfrm>
+            <a:off x="6621980" y="1348263"/>
+            <a:ext cx="1083750" cy="938719"/>
+          </a:xfrm>
+          <a:prstGeom prst="rect">
+            <a:avLst/>
+          </a:prstGeom>
+          <a:noFill/>
+        </p:spPr>
+        <p:txBody>
+          <a:bodyPr wrap="square" rtlCol="0">
+            <a:spAutoFit/>
+          </a:bodyPr>
+          <a:lstStyle/>
+          <a:p>
+            <a:r>
+              <a:rPr lang="en-US" sz="1100" dirty="0"/>
+              <a:t>Communicate with the gripper through networking</a:t>
+            </a:r>
+          </a:p>
+        </p:txBody>
+      </p:sp>
+      <p:sp>
+        <p:nvSpPr>
+          <p:cNvPr id="50" name="Rectangle 49">
+            <a:extLst>
+              <a:ext uri="{FF2B5EF4-FFF2-40B4-BE49-F238E27FC236}">
+                <a16:creationId xmlns:a16="http://schemas.microsoft.com/office/drawing/2014/main" id="{ABBCB4D8-9B17-3863-F2D6-E684E1425E07}"/>
+              </a:ext>
+            </a:extLst>
+          </p:cNvPr>
+          <p:cNvSpPr/>
+          <p:nvPr/>
+        </p:nvSpPr>
+        <p:spPr>
+          <a:xfrm>
+            <a:off x="4830664" y="3633470"/>
+            <a:ext cx="2070102" cy="723900"/>
+          </a:xfrm>
+          <a:prstGeom prst="rect">
+            <a:avLst/>
+          </a:prstGeom>
+        </p:spPr>
+        <p:style>
+          <a:lnRef idx="2">
+            <a:schemeClr val="accent3">
+              <a:shade val="15000"/>
+            </a:schemeClr>
+          </a:lnRef>
+          <a:fillRef idx="1">
+            <a:schemeClr val="accent3"/>
+          </a:fillRef>
+          <a:effectRef idx="0">
+            <a:schemeClr val="accent3"/>
+          </a:effectRef>
+          <a:fontRef idx="minor">
+            <a:schemeClr val="lt1"/>
+          </a:fontRef>
+        </p:style>
+        <p:txBody>
+          <a:bodyPr rtlCol="0" anchor="ctr"/>
+          <a:lstStyle/>
+          <a:p>
+            <a:pPr algn="ctr"/>
+            <a:r>
+              <a:rPr lang="en-US" sz="1200" dirty="0"/>
+              <a:t>Manipulation Controller 2FG</a:t>
+            </a:r>
+          </a:p>
+          <a:p>
+            <a:pPr algn="ctr"/>
+            <a:endParaRPr lang="en-US" sz="1200" dirty="0"/>
+          </a:p>
+          <a:p>
+            <a:pPr algn="ctr"/>
+            <a:endParaRPr lang="en-US" sz="1200" dirty="0"/>
+          </a:p>
+        </p:txBody>
+      </p:sp>
+      <p:sp>
+        <p:nvSpPr>
+          <p:cNvPr id="51" name="Rectangle 50">
+            <a:extLst>
+              <a:ext uri="{FF2B5EF4-FFF2-40B4-BE49-F238E27FC236}">
+                <a16:creationId xmlns:a16="http://schemas.microsoft.com/office/drawing/2014/main" id="{B9252E91-EA56-C286-6334-5DF9A28992BF}"/>
+              </a:ext>
+            </a:extLst>
+          </p:cNvPr>
+          <p:cNvSpPr/>
+          <p:nvPr/>
+        </p:nvSpPr>
+        <p:spPr>
+          <a:xfrm>
+            <a:off x="5323840" y="3995420"/>
+            <a:ext cx="1083750" cy="253184"/>
+          </a:xfrm>
+          <a:prstGeom prst="rect">
+            <a:avLst/>
+          </a:prstGeom>
+        </p:spPr>
+        <p:style>
+          <a:lnRef idx="2">
+            <a:schemeClr val="accent3">
+              <a:shade val="15000"/>
+            </a:schemeClr>
+          </a:lnRef>
+          <a:fillRef idx="1">
+            <a:schemeClr val="accent3"/>
+          </a:fillRef>
+          <a:effectRef idx="0">
+            <a:schemeClr val="accent3"/>
+          </a:effectRef>
+          <a:fontRef idx="minor">
+            <a:schemeClr val="lt1"/>
+          </a:fontRef>
+        </p:style>
+        <p:txBody>
+          <a:bodyPr rtlCol="0" anchor="ctr"/>
+          <a:lstStyle/>
+          <a:p>
+            <a:pPr algn="ctr"/>
+            <a:r>
+              <a:rPr lang="en-US" sz="800" dirty="0"/>
+              <a:t>Two Finger Gripper</a:t>
+            </a:r>
+          </a:p>
+        </p:txBody>
+      </p:sp>
+      <p:sp>
+        <p:nvSpPr>
+          <p:cNvPr id="52" name="Rectangle 51">
+            <a:extLst>
+              <a:ext uri="{FF2B5EF4-FFF2-40B4-BE49-F238E27FC236}">
+                <a16:creationId xmlns:a16="http://schemas.microsoft.com/office/drawing/2014/main" id="{3672838D-8A8C-D6AF-DDC3-E12D17EBC1D8}"/>
+              </a:ext>
+            </a:extLst>
+          </p:cNvPr>
+          <p:cNvSpPr/>
+          <p:nvPr/>
+        </p:nvSpPr>
+        <p:spPr>
+          <a:xfrm>
+            <a:off x="1983740" y="3633470"/>
+            <a:ext cx="2070102" cy="723900"/>
+          </a:xfrm>
+          <a:prstGeom prst="rect">
+            <a:avLst/>
+          </a:prstGeom>
+        </p:spPr>
+        <p:style>
+          <a:lnRef idx="2">
+            <a:schemeClr val="accent3">
+              <a:shade val="15000"/>
+            </a:schemeClr>
+          </a:lnRef>
+          <a:fillRef idx="1">
+            <a:schemeClr val="accent3"/>
+          </a:fillRef>
+          <a:effectRef idx="0">
+            <a:schemeClr val="accent3"/>
+          </a:effectRef>
+          <a:fontRef idx="minor">
+            <a:schemeClr val="lt1"/>
+          </a:fontRef>
+        </p:style>
+        <p:txBody>
+          <a:bodyPr rtlCol="0" anchor="ctr"/>
+          <a:lstStyle/>
+          <a:p>
+            <a:pPr algn="ctr"/>
+            <a:r>
+              <a:rPr lang="en-US" sz="1200" dirty="0"/>
+              <a:t>Manipulation Controller VG</a:t>
+            </a:r>
+          </a:p>
+          <a:p>
+            <a:pPr algn="ctr"/>
+            <a:endParaRPr lang="en-US" sz="1200" dirty="0"/>
+          </a:p>
+          <a:p>
+            <a:pPr algn="ctr"/>
+            <a:endParaRPr lang="en-US" sz="1200" dirty="0"/>
+          </a:p>
+        </p:txBody>
+      </p:sp>
+      <p:sp>
+        <p:nvSpPr>
+          <p:cNvPr id="53" name="Rectangle 52">
+            <a:extLst>
+              <a:ext uri="{FF2B5EF4-FFF2-40B4-BE49-F238E27FC236}">
+                <a16:creationId xmlns:a16="http://schemas.microsoft.com/office/drawing/2014/main" id="{3E38CF64-9644-AC6D-9057-94ECFBB27B35}"/>
+              </a:ext>
+            </a:extLst>
+          </p:cNvPr>
+          <p:cNvSpPr/>
+          <p:nvPr/>
+        </p:nvSpPr>
+        <p:spPr>
+          <a:xfrm>
+            <a:off x="2465275" y="4019483"/>
+            <a:ext cx="1083750" cy="253184"/>
+          </a:xfrm>
+          <a:prstGeom prst="rect">
+            <a:avLst/>
+          </a:prstGeom>
+        </p:spPr>
+        <p:style>
+          <a:lnRef idx="2">
+            <a:schemeClr val="accent3">
+              <a:shade val="15000"/>
+            </a:schemeClr>
+          </a:lnRef>
+          <a:fillRef idx="1">
+            <a:schemeClr val="accent3"/>
+          </a:fillRef>
+          <a:effectRef idx="0">
+            <a:schemeClr val="accent3"/>
+          </a:effectRef>
+          <a:fontRef idx="minor">
+            <a:schemeClr val="lt1"/>
+          </a:fontRef>
+        </p:style>
+        <p:txBody>
+          <a:bodyPr rtlCol="0" anchor="ctr"/>
+          <a:lstStyle/>
+          <a:p>
+            <a:pPr algn="ctr"/>
+            <a:r>
+              <a:rPr lang="en-US" sz="800" dirty="0"/>
+              <a:t>Vacuum Gripper</a:t>
+            </a:r>
+          </a:p>
+        </p:txBody>
+      </p:sp>
+      <p:grpSp>
+        <p:nvGrpSpPr>
+          <p:cNvPr id="54" name="Group 53">
+            <a:extLst>
+              <a:ext uri="{FF2B5EF4-FFF2-40B4-BE49-F238E27FC236}">
+                <a16:creationId xmlns:a16="http://schemas.microsoft.com/office/drawing/2014/main" id="{7CA99311-E4D8-C95E-B090-8555901A631E}"/>
+              </a:ext>
+            </a:extLst>
+          </p:cNvPr>
+          <p:cNvGrpSpPr/>
+          <p:nvPr/>
+        </p:nvGrpSpPr>
+        <p:grpSpPr>
+          <a:xfrm rot="15993261">
+            <a:off x="4897488" y="2963411"/>
+            <a:ext cx="720380" cy="619249"/>
+            <a:chOff x="6461366" y="577301"/>
+            <a:chExt cx="607772" cy="614077"/>
+          </a:xfrm>
+        </p:grpSpPr>
+        <p:cxnSp>
+          <p:nvCxnSpPr>
+            <p:cNvPr id="55" name="Straight Arrow Connector 54">
+              <a:extLst>
+                <a:ext uri="{FF2B5EF4-FFF2-40B4-BE49-F238E27FC236}">
+                  <a16:creationId xmlns:a16="http://schemas.microsoft.com/office/drawing/2014/main" id="{E6EEDF78-E498-8CFB-41E7-4D8878304D61}"/>
+                </a:ext>
+              </a:extLst>
+            </p:cNvPr>
+            <p:cNvCxnSpPr>
+              <a:cxnSpLocks/>
+            </p:cNvCxnSpPr>
+            <p:nvPr/>
+          </p:nvCxnSpPr>
+          <p:spPr>
+            <a:xfrm rot="6232653" flipH="1" flipV="1">
+              <a:off x="6397060" y="689725"/>
+              <a:ext cx="565959" cy="437348"/>
+            </a:xfrm>
+            <a:prstGeom prst="straightConnector1">
+              <a:avLst/>
+            </a:prstGeom>
+            <a:ln>
+              <a:headEnd w="lg" len="lg"/>
+              <a:tailEnd type="none" w="lg" len="lg"/>
+            </a:ln>
+          </p:spPr>
+          <p:style>
+            <a:lnRef idx="2">
+              <a:schemeClr val="accent3"/>
+            </a:lnRef>
+            <a:fillRef idx="0">
+              <a:schemeClr val="accent3"/>
+            </a:fillRef>
+            <a:effectRef idx="1">
+              <a:schemeClr val="accent3"/>
+            </a:effectRef>
+            <a:fontRef idx="minor">
+              <a:schemeClr val="tx1"/>
+            </a:fontRef>
+          </p:style>
+        </p:cxnSp>
+        <p:sp>
+          <p:nvSpPr>
+            <p:cNvPr id="56" name="Isosceles Triangle 55">
+              <a:extLst>
+                <a:ext uri="{FF2B5EF4-FFF2-40B4-BE49-F238E27FC236}">
+                  <a16:creationId xmlns:a16="http://schemas.microsoft.com/office/drawing/2014/main" id="{C9BC62F6-541C-4E08-38B2-27E4DA2512D4}"/>
+                </a:ext>
+              </a:extLst>
+            </p:cNvPr>
+            <p:cNvSpPr/>
+            <p:nvPr/>
+          </p:nvSpPr>
+          <p:spPr>
+            <a:xfrm rot="2877949">
+              <a:off x="6921501" y="588413"/>
+              <a:ext cx="158750" cy="136525"/>
+            </a:xfrm>
+            <a:prstGeom prst="triangle">
+              <a:avLst/>
+            </a:prstGeom>
+            <a:noFill/>
+            <a:ln>
+              <a:solidFill>
+                <a:schemeClr val="accent3">
+                  <a:lumMod val="75000"/>
+                </a:schemeClr>
+              </a:solidFill>
+            </a:ln>
+          </p:spPr>
+          <p:style>
+            <a:lnRef idx="2">
+              <a:schemeClr val="accent3">
+                <a:shade val="15000"/>
+              </a:schemeClr>
+            </a:lnRef>
+            <a:fillRef idx="1">
+              <a:schemeClr val="accent3"/>
+            </a:fillRef>
+            <a:effectRef idx="0">
+              <a:schemeClr val="accent3"/>
+            </a:effectRef>
+            <a:fontRef idx="minor">
+              <a:schemeClr val="lt1"/>
+            </a:fontRef>
+          </p:style>
+          <p:txBody>
+            <a:bodyPr rtlCol="0" anchor="ctr"/>
+            <a:lstStyle/>
+            <a:p>
+              <a:pPr algn="ctr"/>
+              <a:endParaRPr lang="en-US"/>
+            </a:p>
+          </p:txBody>
+        </p:sp>
+      </p:grpSp>
+      <p:grpSp>
+        <p:nvGrpSpPr>
+          <p:cNvPr id="58" name="Group 57">
+            <a:extLst>
+              <a:ext uri="{FF2B5EF4-FFF2-40B4-BE49-F238E27FC236}">
+                <a16:creationId xmlns:a16="http://schemas.microsoft.com/office/drawing/2014/main" id="{C7077755-CA21-89C9-64BA-102EFEEC89BE}"/>
+              </a:ext>
+            </a:extLst>
+          </p:cNvPr>
+          <p:cNvGrpSpPr/>
+          <p:nvPr/>
+        </p:nvGrpSpPr>
+        <p:grpSpPr>
+          <a:xfrm rot="20540969">
+            <a:off x="3133440" y="3008000"/>
+            <a:ext cx="720380" cy="619249"/>
+            <a:chOff x="6461366" y="577301"/>
+            <a:chExt cx="607772" cy="614077"/>
+          </a:xfrm>
+        </p:grpSpPr>
+        <p:cxnSp>
+          <p:nvCxnSpPr>
+            <p:cNvPr id="59" name="Straight Arrow Connector 58">
+              <a:extLst>
+                <a:ext uri="{FF2B5EF4-FFF2-40B4-BE49-F238E27FC236}">
+                  <a16:creationId xmlns:a16="http://schemas.microsoft.com/office/drawing/2014/main" id="{8FFD3D79-12BD-6792-FB0E-9782541D0A74}"/>
+                </a:ext>
+              </a:extLst>
+            </p:cNvPr>
+            <p:cNvCxnSpPr>
+              <a:cxnSpLocks/>
+            </p:cNvCxnSpPr>
+            <p:nvPr/>
+          </p:nvCxnSpPr>
+          <p:spPr>
+            <a:xfrm rot="6232653" flipH="1" flipV="1">
+              <a:off x="6397060" y="689725"/>
+              <a:ext cx="565959" cy="437348"/>
+            </a:xfrm>
+            <a:prstGeom prst="straightConnector1">
+              <a:avLst/>
+            </a:prstGeom>
+            <a:ln>
+              <a:headEnd w="lg" len="lg"/>
+              <a:tailEnd type="none" w="lg" len="lg"/>
+            </a:ln>
+          </p:spPr>
+          <p:style>
+            <a:lnRef idx="2">
+              <a:schemeClr val="accent3"/>
+            </a:lnRef>
+            <a:fillRef idx="0">
+              <a:schemeClr val="accent3"/>
+            </a:fillRef>
+            <a:effectRef idx="1">
+              <a:schemeClr val="accent3"/>
+            </a:effectRef>
+            <a:fontRef idx="minor">
+              <a:schemeClr val="tx1"/>
+            </a:fontRef>
+          </p:style>
+        </p:cxnSp>
+        <p:sp>
+          <p:nvSpPr>
+            <p:cNvPr id="60" name="Isosceles Triangle 59">
+              <a:extLst>
+                <a:ext uri="{FF2B5EF4-FFF2-40B4-BE49-F238E27FC236}">
+                  <a16:creationId xmlns:a16="http://schemas.microsoft.com/office/drawing/2014/main" id="{31C52BAB-65E5-6A71-B546-9462821D657E}"/>
+                </a:ext>
+              </a:extLst>
+            </p:cNvPr>
+            <p:cNvSpPr/>
+            <p:nvPr/>
+          </p:nvSpPr>
+          <p:spPr>
+            <a:xfrm rot="2877949">
+              <a:off x="6921501" y="588413"/>
+              <a:ext cx="158750" cy="136525"/>
+            </a:xfrm>
+            <a:prstGeom prst="triangle">
+              <a:avLst/>
+            </a:prstGeom>
+            <a:noFill/>
+            <a:ln>
+              <a:solidFill>
+                <a:schemeClr val="accent3">
+                  <a:lumMod val="75000"/>
+                </a:schemeClr>
+              </a:solidFill>
+            </a:ln>
+          </p:spPr>
+          <p:style>
+            <a:lnRef idx="2">
+              <a:schemeClr val="accent3">
+                <a:shade val="15000"/>
+              </a:schemeClr>
+            </a:lnRef>
+            <a:fillRef idx="1">
+              <a:schemeClr val="accent3"/>
+            </a:fillRef>
+            <a:effectRef idx="0">
+              <a:schemeClr val="accent3"/>
+            </a:effectRef>
+            <a:fontRef idx="minor">
+              <a:schemeClr val="lt1"/>
+            </a:fontRef>
+          </p:style>
+          <p:txBody>
+            <a:bodyPr rtlCol="0" anchor="ctr"/>
+            <a:lstStyle/>
+            <a:p>
+              <a:pPr algn="ctr"/>
+              <a:endParaRPr lang="en-US"/>
+            </a:p>
+          </p:txBody>
+        </p:sp>
+      </p:grpSp>
+      <p:sp>
+        <p:nvSpPr>
+          <p:cNvPr id="2" name="Rectangle 1">
+            <a:extLst>
+              <a:ext uri="{FF2B5EF4-FFF2-40B4-BE49-F238E27FC236}">
+                <a16:creationId xmlns:a16="http://schemas.microsoft.com/office/drawing/2014/main" id="{387BFD96-74CF-8C2A-CF0D-63328A8508FC}"/>
+              </a:ext>
+            </a:extLst>
+          </p:cNvPr>
+          <p:cNvSpPr/>
+          <p:nvPr/>
+        </p:nvSpPr>
+        <p:spPr>
+          <a:xfrm>
+            <a:off x="7726585" y="-62230"/>
+            <a:ext cx="1917700" cy="641350"/>
+          </a:xfrm>
+          <a:prstGeom prst="rect">
+            <a:avLst/>
+          </a:prstGeom>
+        </p:spPr>
+        <p:style>
+          <a:lnRef idx="2">
+            <a:schemeClr val="accent1">
+              <a:shade val="15000"/>
+            </a:schemeClr>
+          </a:lnRef>
+          <a:fillRef idx="1">
+            <a:schemeClr val="accent1"/>
+          </a:fillRef>
+          <a:effectRef idx="0">
+            <a:schemeClr val="accent1"/>
+          </a:effectRef>
+          <a:fontRef idx="minor">
+            <a:schemeClr val="lt1"/>
+          </a:fontRef>
+        </p:style>
+        <p:txBody>
+          <a:bodyPr rtlCol="0" anchor="ctr"/>
+          <a:lstStyle/>
+          <a:p>
+            <a:pPr algn="ctr"/>
+            <a:r>
+              <a:rPr lang="en-US" sz="1600" dirty="0"/>
+              <a:t>pyrealsense2</a:t>
+            </a:r>
+          </a:p>
+        </p:txBody>
+      </p:sp>
+      <p:sp>
+        <p:nvSpPr>
+          <p:cNvPr id="7" name="Rectangle 6">
+            <a:extLst>
+              <a:ext uri="{FF2B5EF4-FFF2-40B4-BE49-F238E27FC236}">
+                <a16:creationId xmlns:a16="http://schemas.microsoft.com/office/drawing/2014/main" id="{75BEF1D9-85EF-5235-83A4-5F0347AD4565}"/>
+              </a:ext>
+            </a:extLst>
+          </p:cNvPr>
+          <p:cNvSpPr/>
+          <p:nvPr/>
+        </p:nvSpPr>
+        <p:spPr>
+          <a:xfrm>
+            <a:off x="8009160" y="1331595"/>
+            <a:ext cx="1352550" cy="393700"/>
+          </a:xfrm>
+          <a:prstGeom prst="rect">
+            <a:avLst/>
+          </a:prstGeom>
+        </p:spPr>
+        <p:style>
+          <a:lnRef idx="2">
+            <a:schemeClr val="accent2">
+              <a:shade val="15000"/>
+            </a:schemeClr>
+          </a:lnRef>
+          <a:fillRef idx="1">
+            <a:schemeClr val="accent2"/>
+          </a:fillRef>
+          <a:effectRef idx="0">
+            <a:schemeClr val="accent2"/>
+          </a:effectRef>
+          <a:fontRef idx="minor">
+            <a:schemeClr val="lt1"/>
+          </a:fontRef>
+        </p:style>
+        <p:txBody>
+          <a:bodyPr rtlCol="0" anchor="ctr"/>
+          <a:lstStyle/>
+          <a:p>
+            <a:pPr algn="ctr"/>
+            <a:r>
+              <a:rPr lang="en-US" sz="1200" dirty="0"/>
+              <a:t>Camera</a:t>
+            </a:r>
+          </a:p>
+        </p:txBody>
+      </p:sp>
+      <p:sp>
+        <p:nvSpPr>
+          <p:cNvPr id="9" name="Rectangle 8">
+            <a:extLst>
+              <a:ext uri="{FF2B5EF4-FFF2-40B4-BE49-F238E27FC236}">
+                <a16:creationId xmlns:a16="http://schemas.microsoft.com/office/drawing/2014/main" id="{A557CD72-14AA-32F0-5C89-93D7C0B06A44}"/>
+              </a:ext>
+            </a:extLst>
+          </p:cNvPr>
+          <p:cNvSpPr/>
+          <p:nvPr/>
+        </p:nvSpPr>
+        <p:spPr>
+          <a:xfrm>
+            <a:off x="8009160" y="2109054"/>
+            <a:ext cx="1352550" cy="546100"/>
+          </a:xfrm>
+          <a:prstGeom prst="rect">
+            <a:avLst/>
+          </a:prstGeom>
+        </p:spPr>
+        <p:style>
+          <a:lnRef idx="2">
+            <a:schemeClr val="accent2">
+              <a:shade val="15000"/>
+            </a:schemeClr>
+          </a:lnRef>
+          <a:fillRef idx="1">
+            <a:schemeClr val="accent2"/>
+          </a:fillRef>
+          <a:effectRef idx="0">
+            <a:schemeClr val="accent2"/>
+          </a:effectRef>
+          <a:fontRef idx="minor">
+            <a:schemeClr val="lt1"/>
+          </a:fontRef>
+        </p:style>
+        <p:txBody>
+          <a:bodyPr rtlCol="0" anchor="ctr"/>
+          <a:lstStyle/>
+          <a:p>
+            <a:pPr algn="ctr"/>
+            <a:r>
+              <a:rPr lang="en-US" sz="1200" dirty="0"/>
+              <a:t>Camera With Recording</a:t>
+            </a:r>
+          </a:p>
+        </p:txBody>
+      </p:sp>
+      <p:grpSp>
+        <p:nvGrpSpPr>
+          <p:cNvPr id="13" name="Group 12">
+            <a:extLst>
+              <a:ext uri="{FF2B5EF4-FFF2-40B4-BE49-F238E27FC236}">
+                <a16:creationId xmlns:a16="http://schemas.microsoft.com/office/drawing/2014/main" id="{F4A72A1D-694D-79B8-A7FF-AA04EF9CF4C0}"/>
+              </a:ext>
+            </a:extLst>
+          </p:cNvPr>
+          <p:cNvGrpSpPr/>
+          <p:nvPr/>
+        </p:nvGrpSpPr>
+        <p:grpSpPr>
+          <a:xfrm rot="18500679">
+            <a:off x="8466917" y="1813040"/>
+            <a:ext cx="319396" cy="193567"/>
+            <a:chOff x="5975045" y="638232"/>
+            <a:chExt cx="309794" cy="186995"/>
+          </a:xfrm>
+        </p:grpSpPr>
+        <p:cxnSp>
+          <p:nvCxnSpPr>
+            <p:cNvPr id="14" name="Straight Arrow Connector 13">
+              <a:extLst>
+                <a:ext uri="{FF2B5EF4-FFF2-40B4-BE49-F238E27FC236}">
+                  <a16:creationId xmlns:a16="http://schemas.microsoft.com/office/drawing/2014/main" id="{E1A9166F-F50E-F52B-913E-73C8AEB0937D}"/>
+                </a:ext>
+              </a:extLst>
+            </p:cNvPr>
+            <p:cNvCxnSpPr>
+              <a:cxnSpLocks/>
+            </p:cNvCxnSpPr>
+            <p:nvPr/>
+          </p:nvCxnSpPr>
+          <p:spPr>
+            <a:xfrm rot="3099321" flipV="1">
+              <a:off x="6079978" y="720294"/>
+              <a:ext cx="0" cy="209865"/>
+            </a:xfrm>
+            <a:prstGeom prst="straightConnector1">
+              <a:avLst/>
+            </a:prstGeom>
+            <a:ln>
+              <a:headEnd w="lg" len="lg"/>
+              <a:tailEnd type="none" w="lg" len="lg"/>
+            </a:ln>
+          </p:spPr>
+          <p:style>
+            <a:lnRef idx="2">
+              <a:schemeClr val="accent2"/>
+            </a:lnRef>
+            <a:fillRef idx="1">
+              <a:schemeClr val="lt1"/>
+            </a:fillRef>
+            <a:effectRef idx="0">
+              <a:schemeClr val="accent2"/>
+            </a:effectRef>
+            <a:fontRef idx="minor">
+              <a:schemeClr val="dk1"/>
+            </a:fontRef>
+          </p:style>
+        </p:cxnSp>
+        <p:sp>
+          <p:nvSpPr>
+            <p:cNvPr id="15" name="Isosceles Triangle 14">
+              <a:extLst>
+                <a:ext uri="{FF2B5EF4-FFF2-40B4-BE49-F238E27FC236}">
+                  <a16:creationId xmlns:a16="http://schemas.microsoft.com/office/drawing/2014/main" id="{FA705F23-DFE8-4A8A-09C1-94181BF5DEA8}"/>
+                </a:ext>
+              </a:extLst>
+            </p:cNvPr>
+            <p:cNvSpPr/>
+            <p:nvPr/>
+          </p:nvSpPr>
+          <p:spPr>
+            <a:xfrm rot="3190820">
+              <a:off x="6137202" y="649344"/>
+              <a:ext cx="158750" cy="136525"/>
+            </a:xfrm>
+            <a:prstGeom prst="triangle">
+              <a:avLst/>
+            </a:prstGeom>
+            <a:ln/>
+          </p:spPr>
+          <p:style>
+            <a:lnRef idx="2">
+              <a:schemeClr val="accent2"/>
+            </a:lnRef>
+            <a:fillRef idx="1">
+              <a:schemeClr val="lt1"/>
+            </a:fillRef>
+            <a:effectRef idx="0">
+              <a:schemeClr val="accent2"/>
+            </a:effectRef>
+            <a:fontRef idx="minor">
+              <a:schemeClr val="dk1"/>
+            </a:fontRef>
+          </p:style>
+          <p:txBody>
+            <a:bodyPr rtlCol="0" anchor="ctr"/>
+            <a:lstStyle/>
+            <a:p>
+              <a:pPr algn="ctr"/>
+              <a:endParaRPr lang="en-US"/>
+            </a:p>
+          </p:txBody>
+        </p:sp>
+      </p:grpSp>
+      <p:cxnSp>
+        <p:nvCxnSpPr>
+          <p:cNvPr id="16" name="Straight Arrow Connector 15">
+            <a:extLst>
+              <a:ext uri="{FF2B5EF4-FFF2-40B4-BE49-F238E27FC236}">
+                <a16:creationId xmlns:a16="http://schemas.microsoft.com/office/drawing/2014/main" id="{BD837368-C377-9DD4-E744-826E51DEDD86}"/>
+              </a:ext>
+            </a:extLst>
+          </p:cNvPr>
+          <p:cNvCxnSpPr/>
+          <p:nvPr/>
+        </p:nvCxnSpPr>
+        <p:spPr>
+          <a:xfrm flipV="1">
+            <a:off x="8685435" y="579120"/>
+            <a:ext cx="0" cy="752475"/>
+          </a:xfrm>
+          <a:prstGeom prst="straightConnector1">
+            <a:avLst/>
+          </a:prstGeom>
+          <a:ln>
+            <a:solidFill>
+              <a:schemeClr val="accent2"/>
+            </a:solidFill>
+            <a:prstDash val="dash"/>
+            <a:headEnd type="none" w="med" len="med"/>
+            <a:tailEnd type="arrow" w="med" len="med"/>
+          </a:ln>
+        </p:spPr>
+        <p:style>
+          <a:lnRef idx="2">
+            <a:schemeClr val="accent5"/>
+          </a:lnRef>
+          <a:fillRef idx="0">
+            <a:schemeClr val="accent5"/>
+          </a:fillRef>
+          <a:effectRef idx="1">
+            <a:schemeClr val="accent5"/>
+          </a:effectRef>
+          <a:fontRef idx="minor">
+            <a:schemeClr val="tx1"/>
+          </a:fontRef>
+        </p:style>
+      </p:cxnSp>
+      <p:sp>
+        <p:nvSpPr>
+          <p:cNvPr id="17" name="Rectangle 16">
+            <a:extLst>
+              <a:ext uri="{FF2B5EF4-FFF2-40B4-BE49-F238E27FC236}">
+                <a16:creationId xmlns:a16="http://schemas.microsoft.com/office/drawing/2014/main" id="{1F31159C-B8CD-A725-D34B-DD5E7B4023FB}"/>
+              </a:ext>
+            </a:extLst>
+          </p:cNvPr>
+          <p:cNvSpPr/>
+          <p:nvPr/>
+        </p:nvSpPr>
+        <p:spPr>
+          <a:xfrm>
+            <a:off x="10093767" y="1331595"/>
+            <a:ext cx="1352550" cy="443449"/>
+          </a:xfrm>
+          <a:prstGeom prst="rect">
+            <a:avLst/>
+          </a:prstGeom>
+        </p:spPr>
+        <p:style>
+          <a:lnRef idx="2">
+            <a:schemeClr val="accent2">
+              <a:shade val="15000"/>
+            </a:schemeClr>
+          </a:lnRef>
+          <a:fillRef idx="1">
+            <a:schemeClr val="accent2"/>
+          </a:fillRef>
+          <a:effectRef idx="0">
+            <a:schemeClr val="accent2"/>
+          </a:effectRef>
+          <a:fontRef idx="minor">
+            <a:schemeClr val="lt1"/>
+          </a:fontRef>
+        </p:style>
+        <p:txBody>
+          <a:bodyPr rtlCol="0" anchor="ctr"/>
+          <a:lstStyle/>
+          <a:p>
+            <a:pPr algn="ctr"/>
+            <a:r>
+              <a:rPr lang="en-US" sz="1200" dirty="0"/>
+              <a:t>Object Detection</a:t>
+            </a:r>
+          </a:p>
+        </p:txBody>
+      </p:sp>
+      <p:sp>
+        <p:nvSpPr>
+          <p:cNvPr id="18" name="Rectangle 17">
+            <a:extLst>
+              <a:ext uri="{FF2B5EF4-FFF2-40B4-BE49-F238E27FC236}">
+                <a16:creationId xmlns:a16="http://schemas.microsoft.com/office/drawing/2014/main" id="{62CE6C9E-45C9-8A03-7F99-0381830EF3D5}"/>
+              </a:ext>
+            </a:extLst>
+          </p:cNvPr>
+          <p:cNvSpPr/>
+          <p:nvPr/>
+        </p:nvSpPr>
+        <p:spPr>
+          <a:xfrm>
+            <a:off x="9811192" y="-62230"/>
+            <a:ext cx="1917700" cy="641350"/>
+          </a:xfrm>
+          <a:prstGeom prst="rect">
+            <a:avLst/>
+          </a:prstGeom>
+        </p:spPr>
+        <p:style>
+          <a:lnRef idx="2">
+            <a:schemeClr val="accent1">
+              <a:shade val="15000"/>
+            </a:schemeClr>
+          </a:lnRef>
+          <a:fillRef idx="1">
+            <a:schemeClr val="accent1"/>
+          </a:fillRef>
+          <a:effectRef idx="0">
+            <a:schemeClr val="accent1"/>
+          </a:effectRef>
+          <a:fontRef idx="minor">
+            <a:schemeClr val="lt1"/>
+          </a:fontRef>
+        </p:style>
+        <p:txBody>
+          <a:bodyPr rtlCol="0" anchor="ctr"/>
+          <a:lstStyle/>
+          <a:p>
+            <a:pPr algn="ctr"/>
+            <a:r>
+              <a:rPr lang="en-US" sz="1600" dirty="0"/>
+              <a:t>YOLO-WORLD</a:t>
+            </a:r>
+            <a:br>
+              <a:rPr lang="en-US" sz="1600" dirty="0"/>
+            </a:br>
+            <a:r>
+              <a:rPr lang="en-US" sz="1200" dirty="0"/>
+              <a:t>(ultralytics)</a:t>
+            </a:r>
+            <a:endParaRPr lang="en-US" sz="1600" dirty="0"/>
+          </a:p>
+        </p:txBody>
+      </p:sp>
+      <p:cxnSp>
+        <p:nvCxnSpPr>
+          <p:cNvPr id="19" name="Straight Arrow Connector 18">
+            <a:extLst>
+              <a:ext uri="{FF2B5EF4-FFF2-40B4-BE49-F238E27FC236}">
+                <a16:creationId xmlns:a16="http://schemas.microsoft.com/office/drawing/2014/main" id="{EB068A7C-0137-3A42-F078-40D721E16A6D}"/>
+              </a:ext>
+            </a:extLst>
+          </p:cNvPr>
+          <p:cNvCxnSpPr/>
+          <p:nvPr/>
+        </p:nvCxnSpPr>
+        <p:spPr>
+          <a:xfrm flipV="1">
+            <a:off x="10770042" y="579119"/>
+            <a:ext cx="0" cy="752475"/>
+          </a:xfrm>
+          <a:prstGeom prst="straightConnector1">
+            <a:avLst/>
+          </a:prstGeom>
+          <a:ln>
+            <a:solidFill>
+              <a:schemeClr val="accent2"/>
+            </a:solidFill>
+            <a:prstDash val="dash"/>
+            <a:headEnd type="none" w="med" len="med"/>
+            <a:tailEnd type="arrow" w="med" len="med"/>
+          </a:ln>
+        </p:spPr>
+        <p:style>
+          <a:lnRef idx="2">
+            <a:schemeClr val="accent5"/>
+          </a:lnRef>
+          <a:fillRef idx="0">
+            <a:schemeClr val="accent5"/>
+          </a:fillRef>
+          <a:effectRef idx="1">
+            <a:schemeClr val="accent5"/>
+          </a:effectRef>
+          <a:fontRef idx="minor">
+            <a:schemeClr val="tx1"/>
+          </a:fontRef>
+        </p:style>
+      </p:cxnSp>
+      <p:sp>
+        <p:nvSpPr>
+          <p:cNvPr id="11" name="Rectangle 10">
+            <a:extLst>
+              <a:ext uri="{FF2B5EF4-FFF2-40B4-BE49-F238E27FC236}">
+                <a16:creationId xmlns:a16="http://schemas.microsoft.com/office/drawing/2014/main" id="{F75319B2-2F44-1B8E-782A-1B073E888562}"/>
+              </a:ext>
+            </a:extLst>
+          </p:cNvPr>
+          <p:cNvSpPr/>
+          <p:nvPr/>
+        </p:nvSpPr>
+        <p:spPr>
+          <a:xfrm>
+            <a:off x="226659" y="990252"/>
+            <a:ext cx="1618418" cy="1941544"/>
+          </a:xfrm>
+          <a:prstGeom prst="rect">
+            <a:avLst/>
+          </a:prstGeom>
+          <a:noFill/>
+          <a:ln w="38100" cap="flat" cmpd="sng" algn="ctr">
+            <a:solidFill>
+              <a:schemeClr val="accent5"/>
+            </a:solidFill>
+            <a:prstDash val="dash"/>
+            <a:round/>
+            <a:headEnd type="none" w="med" len="med"/>
+            <a:tailEnd type="none" w="med" len="med"/>
+          </a:ln>
+        </p:spPr>
+        <p:style>
+          <a:lnRef idx="0">
+            <a:scrgbClr r="0" g="0" b="0"/>
+          </a:lnRef>
+          <a:fillRef idx="0">
+            <a:scrgbClr r="0" g="0" b="0"/>
+          </a:fillRef>
+          <a:effectRef idx="0">
+            <a:scrgbClr r="0" g="0" b="0"/>
+          </a:effectRef>
+          <a:fontRef idx="minor">
+            <a:schemeClr val="accent5"/>
+          </a:fontRef>
+        </p:style>
+        <p:txBody>
+          <a:bodyPr rtlCol="0" anchor="ctr"/>
+          <a:lstStyle/>
+          <a:p>
+            <a:pPr algn="ctr"/>
+            <a:endParaRPr lang="en-US"/>
+          </a:p>
+        </p:txBody>
+      </p:sp>
+      <p:sp>
+        <p:nvSpPr>
+          <p:cNvPr id="12" name="TextBox 11">
+            <a:extLst>
+              <a:ext uri="{FF2B5EF4-FFF2-40B4-BE49-F238E27FC236}">
+                <a16:creationId xmlns:a16="http://schemas.microsoft.com/office/drawing/2014/main" id="{4EE397E5-6026-5AE4-7198-D42A1E8587EA}"/>
+              </a:ext>
+            </a:extLst>
+          </p:cNvPr>
+          <p:cNvSpPr txBox="1"/>
+          <p:nvPr/>
+        </p:nvSpPr>
+        <p:spPr>
+          <a:xfrm>
+            <a:off x="331506" y="2541211"/>
+            <a:ext cx="1345946" cy="400110"/>
+          </a:xfrm>
+          <a:prstGeom prst="rect">
+            <a:avLst/>
+          </a:prstGeom>
+          <a:noFill/>
+        </p:spPr>
+        <p:txBody>
+          <a:bodyPr wrap="none" rtlCol="0">
+            <a:spAutoFit/>
+          </a:bodyPr>
+          <a:lstStyle/>
+          <a:p>
+            <a:r>
+              <a:rPr lang="en-US" sz="2000" b="1" dirty="0">
+                <a:solidFill>
+                  <a:schemeClr val="accent5">
+                    <a:lumMod val="75000"/>
+                  </a:schemeClr>
+                </a:solidFill>
+              </a:rPr>
+              <a:t>Geometry</a:t>
+            </a:r>
+          </a:p>
+        </p:txBody>
+      </p:sp>
+      <p:sp>
+        <p:nvSpPr>
+          <p:cNvPr id="20" name="Rectangle 19">
+            <a:extLst>
+              <a:ext uri="{FF2B5EF4-FFF2-40B4-BE49-F238E27FC236}">
+                <a16:creationId xmlns:a16="http://schemas.microsoft.com/office/drawing/2014/main" id="{FECF8673-248D-4B0B-1B9D-E2D4285D5E0A}"/>
+              </a:ext>
+            </a:extLst>
+          </p:cNvPr>
+          <p:cNvSpPr/>
+          <p:nvPr/>
+        </p:nvSpPr>
+        <p:spPr>
+          <a:xfrm>
+            <a:off x="1921674" y="990252"/>
+            <a:ext cx="5706030" cy="4016088"/>
+          </a:xfrm>
+          <a:prstGeom prst="rect">
+            <a:avLst/>
+          </a:prstGeom>
+          <a:noFill/>
+          <a:ln w="38100" cap="flat" cmpd="sng" algn="ctr">
+            <a:solidFill>
+              <a:schemeClr val="accent6">
+                <a:lumMod val="50000"/>
+              </a:schemeClr>
+            </a:solidFill>
+            <a:prstDash val="dash"/>
+            <a:round/>
+            <a:headEnd type="none" w="med" len="med"/>
+            <a:tailEnd type="none" w="med" len="med"/>
+          </a:ln>
+        </p:spPr>
+        <p:style>
+          <a:lnRef idx="0">
+            <a:scrgbClr r="0" g="0" b="0"/>
+          </a:lnRef>
+          <a:fillRef idx="0">
+            <a:scrgbClr r="0" g="0" b="0"/>
+          </a:fillRef>
+          <a:effectRef idx="0">
+            <a:scrgbClr r="0" g="0" b="0"/>
+          </a:effectRef>
+          <a:fontRef idx="minor">
+            <a:schemeClr val="accent5"/>
+          </a:fontRef>
+        </p:style>
+        <p:txBody>
+          <a:bodyPr rtlCol="0" anchor="ctr"/>
+          <a:lstStyle/>
+          <a:p>
+            <a:pPr algn="ctr"/>
+            <a:endParaRPr lang="en-US" dirty="0">
+              <a:highlight>
+                <a:srgbClr val="008000"/>
+              </a:highlight>
+            </a:endParaRPr>
+          </a:p>
+        </p:txBody>
+      </p:sp>
+      <p:sp>
+        <p:nvSpPr>
+          <p:cNvPr id="22" name="TextBox 21">
+            <a:extLst>
+              <a:ext uri="{FF2B5EF4-FFF2-40B4-BE49-F238E27FC236}">
+                <a16:creationId xmlns:a16="http://schemas.microsoft.com/office/drawing/2014/main" id="{F7E41BE6-9FD9-CD4D-1DD7-162572B4A043}"/>
+              </a:ext>
+            </a:extLst>
+          </p:cNvPr>
+          <p:cNvSpPr txBox="1"/>
+          <p:nvPr/>
+        </p:nvSpPr>
+        <p:spPr>
+          <a:xfrm>
+            <a:off x="3487116" y="4600468"/>
+            <a:ext cx="2887650" cy="400110"/>
+          </a:xfrm>
+          <a:prstGeom prst="rect">
+            <a:avLst/>
+          </a:prstGeom>
+          <a:noFill/>
+        </p:spPr>
+        <p:txBody>
+          <a:bodyPr wrap="none" rtlCol="0">
+            <a:spAutoFit/>
+          </a:bodyPr>
+          <a:lstStyle/>
+          <a:p>
+            <a:r>
+              <a:rPr lang="en-US" sz="2000" b="1" dirty="0">
+                <a:solidFill>
+                  <a:schemeClr val="accent6">
+                    <a:lumMod val="50000"/>
+                  </a:schemeClr>
+                </a:solidFill>
+              </a:rPr>
+              <a:t>Control &amp; Manipulation</a:t>
+            </a:r>
+          </a:p>
+        </p:txBody>
+      </p:sp>
+      <p:sp>
+        <p:nvSpPr>
+          <p:cNvPr id="23" name="Rectangle 22">
+            <a:extLst>
+              <a:ext uri="{FF2B5EF4-FFF2-40B4-BE49-F238E27FC236}">
+                <a16:creationId xmlns:a16="http://schemas.microsoft.com/office/drawing/2014/main" id="{339A5A35-8223-F1F7-45AC-3DE636D87D5F}"/>
+              </a:ext>
+            </a:extLst>
+          </p:cNvPr>
+          <p:cNvSpPr/>
+          <p:nvPr/>
+        </p:nvSpPr>
+        <p:spPr>
+          <a:xfrm>
+            <a:off x="7807313" y="990252"/>
+            <a:ext cx="3760041" cy="2385408"/>
+          </a:xfrm>
+          <a:prstGeom prst="rect">
+            <a:avLst/>
+          </a:prstGeom>
+          <a:noFill/>
+          <a:ln w="38100" cap="flat" cmpd="sng" algn="ctr">
+            <a:solidFill>
+              <a:schemeClr val="accent2"/>
+            </a:solidFill>
+            <a:prstDash val="dash"/>
+            <a:round/>
+            <a:headEnd type="none" w="med" len="med"/>
+            <a:tailEnd type="none" w="med" len="med"/>
+          </a:ln>
+        </p:spPr>
+        <p:style>
+          <a:lnRef idx="0">
+            <a:scrgbClr r="0" g="0" b="0"/>
+          </a:lnRef>
+          <a:fillRef idx="0">
+            <a:scrgbClr r="0" g="0" b="0"/>
+          </a:fillRef>
+          <a:effectRef idx="0">
+            <a:scrgbClr r="0" g="0" b="0"/>
+          </a:effectRef>
+          <a:fontRef idx="minor">
+            <a:schemeClr val="accent5"/>
+          </a:fontRef>
+        </p:style>
+        <p:txBody>
+          <a:bodyPr rtlCol="0" anchor="ctr"/>
+          <a:lstStyle/>
+          <a:p>
+            <a:pPr algn="ctr"/>
+            <a:endParaRPr lang="en-US" dirty="0">
+              <a:highlight>
+                <a:srgbClr val="008000"/>
+              </a:highlight>
+            </a:endParaRPr>
+          </a:p>
+        </p:txBody>
+      </p:sp>
+      <p:sp>
+        <p:nvSpPr>
+          <p:cNvPr id="24" name="TextBox 23">
+            <a:extLst>
+              <a:ext uri="{FF2B5EF4-FFF2-40B4-BE49-F238E27FC236}">
+                <a16:creationId xmlns:a16="http://schemas.microsoft.com/office/drawing/2014/main" id="{8FB5E128-8A00-E873-2598-F514C6D7A8CC}"/>
+              </a:ext>
+            </a:extLst>
+          </p:cNvPr>
+          <p:cNvSpPr txBox="1"/>
+          <p:nvPr/>
+        </p:nvSpPr>
+        <p:spPr>
+          <a:xfrm>
+            <a:off x="9355778" y="2942136"/>
+            <a:ext cx="910827" cy="400110"/>
+          </a:xfrm>
+          <a:prstGeom prst="rect">
+            <a:avLst/>
+          </a:prstGeom>
+          <a:noFill/>
+        </p:spPr>
+        <p:txBody>
+          <a:bodyPr wrap="none" rtlCol="0">
+            <a:spAutoFit/>
+          </a:bodyPr>
+          <a:lstStyle/>
+          <a:p>
+            <a:r>
+              <a:rPr lang="en-US" sz="2000" b="1" dirty="0">
+                <a:solidFill>
+                  <a:schemeClr val="accent2"/>
+                </a:solidFill>
+              </a:rPr>
+              <a:t>Vision</a:t>
+            </a:r>
+          </a:p>
+        </p:txBody>
+      </p:sp>
+    </p:spTree>
+    <p:extLst>
+      <p:ext uri="{BB962C8B-B14F-4D97-AF65-F5344CB8AC3E}">
+        <p14:creationId xmlns:p14="http://schemas.microsoft.com/office/powerpoint/2010/main" val="1745197940"/>
       </p:ext>
     </p:extLst>
   </p:cSld>

</xml_diff>